<commit_message>
additional analysis has been completed. The presentation has been accordingly modifies
</commit_message>
<xml_diff>
--- a/Project 1 FBRowther.pptx
+++ b/Project 1 FBRowther.pptx
@@ -5,10 +5,10 @@
     <p:sldMasterId id="2147483658" r:id="rId4"/>
   </p:sldMasterIdLst>
   <p:notesMasterIdLst>
-    <p:notesMasterId r:id="rId19"/>
+    <p:notesMasterId r:id="rId22"/>
   </p:notesMasterIdLst>
   <p:handoutMasterIdLst>
-    <p:handoutMasterId r:id="rId20"/>
+    <p:handoutMasterId r:id="rId23"/>
   </p:handoutMasterIdLst>
   <p:sldIdLst>
     <p:sldId id="350" r:id="rId5"/>
@@ -21,10 +21,13 @@
     <p:sldId id="377" r:id="rId12"/>
     <p:sldId id="379" r:id="rId13"/>
     <p:sldId id="381" r:id="rId14"/>
-    <p:sldId id="380" r:id="rId15"/>
-    <p:sldId id="382" r:id="rId16"/>
-    <p:sldId id="364" r:id="rId17"/>
-    <p:sldId id="343" r:id="rId18"/>
+    <p:sldId id="383" r:id="rId15"/>
+    <p:sldId id="380" r:id="rId16"/>
+    <p:sldId id="382" r:id="rId17"/>
+    <p:sldId id="385" r:id="rId18"/>
+    <p:sldId id="387" r:id="rId19"/>
+    <p:sldId id="364" r:id="rId20"/>
+    <p:sldId id="343" r:id="rId21"/>
   </p:sldIdLst>
   <p:sldSz cx="12192000" cy="6858000"/>
   <p:notesSz cx="6858000" cy="9144000"/>
@@ -701,7 +704,7 @@
           <a:p>
             <a:fld id="{A89C7E07-3C67-C64C-8DA0-0404F6303970}" type="slidenum">
               <a:rPr lang="en-US" smtClean="0"/>
-              <a:t>14</a:t>
+              <a:t>17</a:t>
             </a:fld>
             <a:endParaRPr lang="en-US" dirty="0"/>
           </a:p>
@@ -13837,8 +13840,8 @@
         </p:nvSpPr>
         <p:spPr>
           <a:xfrm>
-            <a:off x="299005" y="230670"/>
-            <a:ext cx="9160879" cy="610863"/>
+            <a:off x="464233" y="230670"/>
+            <a:ext cx="11506093" cy="610863"/>
           </a:xfrm>
         </p:spPr>
         <p:txBody>
@@ -13847,14 +13850,24 @@
           </a:bodyPr>
           <a:lstStyle/>
           <a:p>
+            <a:pPr algn="ctr"/>
             <a:r>
               <a:rPr lang="en-US" b="1" i="0" kern="1200" spc="100" baseline="0" dirty="0">
                 <a:latin typeface="+mj-lt"/>
                 <a:ea typeface="+mj-ea"/>
                 <a:cs typeface="+mj-cs"/>
               </a:rPr>
-              <a:t>Fuel-Type</a:t>
-            </a:r>
+              <a:t>Top 10 contributors</a:t>
+            </a:r>
+            <a:r>
+              <a:rPr lang="en-US" dirty="0"/>
+              <a:t> irrespective of sector</a:t>
+            </a:r>
+            <a:endParaRPr lang="en-US" b="1" i="0" kern="1200" spc="100" baseline="0" dirty="0">
+              <a:latin typeface="+mj-lt"/>
+              <a:ea typeface="+mj-ea"/>
+              <a:cs typeface="+mj-cs"/>
+            </a:endParaRPr>
           </a:p>
         </p:txBody>
       </p:sp>
@@ -13876,7 +13889,7 @@
         </p:nvSpPr>
         <p:spPr>
           <a:xfrm>
-            <a:off x="852748" y="1297898"/>
+            <a:off x="919250" y="1315634"/>
             <a:ext cx="4838700" cy="315915"/>
           </a:xfrm>
         </p:spPr>
@@ -13892,221 +13905,25 @@
                 <a:ea typeface="+mn-ea"/>
                 <a:cs typeface="+mn-cs"/>
               </a:rPr>
-              <a:t>SOURCE</a:t>
-            </a:r>
-          </a:p>
-        </p:txBody>
-      </p:sp>
-      <p:sp>
-        <p:nvSpPr>
-          <p:cNvPr id="2" name="Text Placeholder 2">
-            <a:extLst>
-              <a:ext uri="{FF2B5EF4-FFF2-40B4-BE49-F238E27FC236}">
-                <a16:creationId xmlns:a16="http://schemas.microsoft.com/office/drawing/2014/main" id="{77FB3898-A88B-7C5C-2B01-786A7C80AB65}"/>
-              </a:ext>
-            </a:extLst>
-          </p:cNvPr>
-          <p:cNvSpPr txBox="1">
-            <a:spLocks/>
-          </p:cNvSpPr>
-          <p:nvPr/>
-        </p:nvSpPr>
-        <p:spPr>
-          <a:xfrm>
-            <a:off x="6284376" y="1297898"/>
-            <a:ext cx="4838700" cy="315915"/>
-          </a:xfrm>
-          <a:prstGeom prst="rect">
-            <a:avLst/>
-          </a:prstGeom>
-        </p:spPr>
-        <p:txBody>
-          <a:bodyPr vert="horz" lIns="91440" tIns="45720" rIns="91440" bIns="45720" rtlCol="0" anchorCtr="0">
-            <a:noAutofit/>
-          </a:bodyPr>
-          <a:lstStyle>
-            <a:lvl1pPr marL="0" indent="0" algn="l" defTabSz="914400" rtl="0" eaLnBrk="1" latinLnBrk="0" hangingPunct="1">
-              <a:lnSpc>
-                <a:spcPct val="90000"/>
-              </a:lnSpc>
-              <a:spcBef>
-                <a:spcPts val="1000"/>
-              </a:spcBef>
-              <a:buFont typeface="Arial" panose="020B0604020202020204" pitchFamily="34" charset="0"/>
-              <a:buNone/>
-              <a:defRPr sz="1800" b="0" i="0" kern="1200" spc="0" baseline="0">
-                <a:solidFill>
-                  <a:schemeClr val="tx2"/>
-                </a:solidFill>
-                <a:latin typeface="+mj-lt"/>
-                <a:ea typeface="+mn-ea"/>
-                <a:cs typeface="+mn-cs"/>
-              </a:defRPr>
-            </a:lvl1pPr>
-            <a:lvl2pPr marL="457200" indent="0" algn="l" defTabSz="914400" rtl="0" eaLnBrk="1" latinLnBrk="0" hangingPunct="1">
-              <a:lnSpc>
-                <a:spcPct val="90000"/>
-              </a:lnSpc>
-              <a:spcBef>
-                <a:spcPts val="500"/>
-              </a:spcBef>
-              <a:buFont typeface="Arial" panose="020B0604020202020204" pitchFamily="34" charset="0"/>
-              <a:buNone/>
-              <a:defRPr sz="2000" b="1" i="0" kern="1200">
-                <a:solidFill>
-                  <a:schemeClr val="bg1"/>
-                </a:solidFill>
-                <a:latin typeface="+mn-lt"/>
-                <a:ea typeface="+mn-ea"/>
-                <a:cs typeface="+mn-cs"/>
-              </a:defRPr>
-            </a:lvl2pPr>
-            <a:lvl3pPr marL="914400" indent="0" algn="l" defTabSz="914400" rtl="0" eaLnBrk="1" latinLnBrk="0" hangingPunct="1">
-              <a:lnSpc>
-                <a:spcPct val="90000"/>
-              </a:lnSpc>
-              <a:spcBef>
-                <a:spcPts val="500"/>
-              </a:spcBef>
-              <a:buFont typeface="Arial" panose="020B0604020202020204" pitchFamily="34" charset="0"/>
-              <a:buNone/>
-              <a:defRPr sz="1800" b="1" i="0" kern="1200">
-                <a:solidFill>
-                  <a:schemeClr val="bg1"/>
-                </a:solidFill>
-                <a:latin typeface="+mn-lt"/>
-                <a:ea typeface="+mn-ea"/>
-                <a:cs typeface="+mn-cs"/>
-              </a:defRPr>
-            </a:lvl3pPr>
-            <a:lvl4pPr marL="1371600" indent="0" algn="l" defTabSz="914400" rtl="0" eaLnBrk="1" latinLnBrk="0" hangingPunct="1">
-              <a:lnSpc>
-                <a:spcPct val="90000"/>
-              </a:lnSpc>
-              <a:spcBef>
-                <a:spcPts val="500"/>
-              </a:spcBef>
-              <a:buFont typeface="Arial" panose="020B0604020202020204" pitchFamily="34" charset="0"/>
-              <a:buNone/>
-              <a:defRPr sz="1600" b="1" i="0" kern="1200">
-                <a:solidFill>
-                  <a:schemeClr val="bg1"/>
-                </a:solidFill>
-                <a:latin typeface="+mn-lt"/>
-                <a:ea typeface="+mn-ea"/>
-                <a:cs typeface="+mn-cs"/>
-              </a:defRPr>
-            </a:lvl4pPr>
-            <a:lvl5pPr marL="1828800" indent="0" algn="l" defTabSz="914400" rtl="0" eaLnBrk="1" latinLnBrk="0" hangingPunct="1">
-              <a:lnSpc>
-                <a:spcPct val="90000"/>
-              </a:lnSpc>
-              <a:spcBef>
-                <a:spcPts val="500"/>
-              </a:spcBef>
-              <a:buFont typeface="Arial" panose="020B0604020202020204" pitchFamily="34" charset="0"/>
-              <a:buNone/>
-              <a:defRPr sz="1600" b="1" i="0" kern="1200">
-                <a:solidFill>
-                  <a:schemeClr val="bg1"/>
-                </a:solidFill>
-                <a:latin typeface="+mn-lt"/>
-                <a:ea typeface="+mn-ea"/>
-                <a:cs typeface="+mn-cs"/>
-              </a:defRPr>
-            </a:lvl5pPr>
-            <a:lvl6pPr marL="2286000" indent="0" algn="l" defTabSz="914400" rtl="0" eaLnBrk="1" latinLnBrk="0" hangingPunct="1">
-              <a:lnSpc>
-                <a:spcPct val="90000"/>
-              </a:lnSpc>
-              <a:spcBef>
-                <a:spcPts val="500"/>
-              </a:spcBef>
-              <a:buFont typeface="Arial" panose="020B0604020202020204" pitchFamily="34" charset="0"/>
-              <a:buNone/>
-              <a:defRPr sz="1600" b="1" kern="1200">
-                <a:solidFill>
-                  <a:schemeClr val="tx1"/>
-                </a:solidFill>
-                <a:latin typeface="+mn-lt"/>
-                <a:ea typeface="+mn-ea"/>
-                <a:cs typeface="+mn-cs"/>
-              </a:defRPr>
-            </a:lvl6pPr>
-            <a:lvl7pPr marL="2743200" indent="0" algn="l" defTabSz="914400" rtl="0" eaLnBrk="1" latinLnBrk="0" hangingPunct="1">
-              <a:lnSpc>
-                <a:spcPct val="90000"/>
-              </a:lnSpc>
-              <a:spcBef>
-                <a:spcPts val="500"/>
-              </a:spcBef>
-              <a:buFont typeface="Arial" panose="020B0604020202020204" pitchFamily="34" charset="0"/>
-              <a:buNone/>
-              <a:defRPr sz="1600" b="1" kern="1200">
-                <a:solidFill>
-                  <a:schemeClr val="tx1"/>
-                </a:solidFill>
-                <a:latin typeface="+mn-lt"/>
-                <a:ea typeface="+mn-ea"/>
-                <a:cs typeface="+mn-cs"/>
-              </a:defRPr>
-            </a:lvl7pPr>
-            <a:lvl8pPr marL="3200400" indent="0" algn="l" defTabSz="914400" rtl="0" eaLnBrk="1" latinLnBrk="0" hangingPunct="1">
-              <a:lnSpc>
-                <a:spcPct val="90000"/>
-              </a:lnSpc>
-              <a:spcBef>
-                <a:spcPts val="500"/>
-              </a:spcBef>
-              <a:buFont typeface="Arial" panose="020B0604020202020204" pitchFamily="34" charset="0"/>
-              <a:buNone/>
-              <a:defRPr sz="1600" b="1" kern="1200">
-                <a:solidFill>
-                  <a:schemeClr val="tx1"/>
-                </a:solidFill>
-                <a:latin typeface="+mn-lt"/>
-                <a:ea typeface="+mn-ea"/>
-                <a:cs typeface="+mn-cs"/>
-              </a:defRPr>
-            </a:lvl8pPr>
-            <a:lvl9pPr marL="3657600" indent="0" algn="l" defTabSz="914400" rtl="0" eaLnBrk="1" latinLnBrk="0" hangingPunct="1">
-              <a:lnSpc>
-                <a:spcPct val="90000"/>
-              </a:lnSpc>
-              <a:spcBef>
-                <a:spcPts val="500"/>
-              </a:spcBef>
-              <a:buFont typeface="Arial" panose="020B0604020202020204" pitchFamily="34" charset="0"/>
-              <a:buNone/>
-              <a:defRPr sz="1600" b="1" kern="1200">
-                <a:solidFill>
-                  <a:schemeClr val="tx1"/>
-                </a:solidFill>
-                <a:latin typeface="+mn-lt"/>
-                <a:ea typeface="+mn-ea"/>
-                <a:cs typeface="+mn-cs"/>
-              </a:defRPr>
-            </a:lvl9pPr>
-          </a:lstStyle>
-          <a:p>
-            <a:pPr marL="228600" indent="-228600"/>
-            <a:r>
-              <a:rPr lang="en-US" b="0" i="0" kern="1200" spc="0" baseline="0" dirty="0">
-                <a:latin typeface="+mj-lt"/>
-                <a:ea typeface="+mn-ea"/>
-                <a:cs typeface="+mn-cs"/>
-              </a:rPr>
-              <a:t>END-USERS</a:t>
-            </a:r>
+              <a:t>SOURCES &amp; END-USERS</a:t>
+            </a:r>
+            <a:endParaRPr lang="en-US" sz="2000" b="0" i="0" kern="1200" spc="0" baseline="0" dirty="0">
+              <a:solidFill>
+                <a:schemeClr val="bg1"/>
+              </a:solidFill>
+              <a:latin typeface="+mj-lt"/>
+              <a:ea typeface="+mn-ea"/>
+              <a:cs typeface="+mn-cs"/>
+            </a:endParaRPr>
           </a:p>
         </p:txBody>
       </p:sp>
       <p:pic>
         <p:nvPicPr>
-          <p:cNvPr id="5" name="Picture 4" descr="Chart, pie chart&#10;&#10;Description automatically generated">
-            <a:extLst>
-              <a:ext uri="{FF2B5EF4-FFF2-40B4-BE49-F238E27FC236}">
-                <a16:creationId xmlns:a16="http://schemas.microsoft.com/office/drawing/2014/main" id="{49B389C1-01B9-3D3E-4148-76CD7928A4C3}"/>
+          <p:cNvPr id="4" name="Picture 3" descr="Chart, pie chart&#10;&#10;Description automatically generated">
+            <a:extLst>
+              <a:ext uri="{FF2B5EF4-FFF2-40B4-BE49-F238E27FC236}">
+                <a16:creationId xmlns:a16="http://schemas.microsoft.com/office/drawing/2014/main" id="{269F38F8-696D-E715-07AD-423DBFDB039E}"/>
               </a:ext>
             </a:extLst>
           </p:cNvPr>
@@ -14129,44 +13946,8 @@
         </p:blipFill>
         <p:spPr>
           <a:xfrm>
-            <a:off x="5933931" y="2070178"/>
-            <a:ext cx="5022244" cy="4757043"/>
-          </a:xfrm>
-          <a:prstGeom prst="rect">
-            <a:avLst/>
-          </a:prstGeom>
-        </p:spPr>
-      </p:pic>
-      <p:pic>
-        <p:nvPicPr>
-          <p:cNvPr id="8" name="Picture 7" descr="Chart, pie chart&#10;&#10;Description automatically generated">
-            <a:extLst>
-              <a:ext uri="{FF2B5EF4-FFF2-40B4-BE49-F238E27FC236}">
-                <a16:creationId xmlns:a16="http://schemas.microsoft.com/office/drawing/2014/main" id="{D0214050-C5C3-672D-4A8B-730579C17B12}"/>
-              </a:ext>
-            </a:extLst>
-          </p:cNvPr>
-          <p:cNvPicPr>
-            <a:picLocks noChangeAspect="1"/>
-          </p:cNvPicPr>
-          <p:nvPr/>
-        </p:nvPicPr>
-        <p:blipFill>
-          <a:blip r:embed="rId3">
-            <a:extLst>
-              <a:ext uri="{28A0092B-C50C-407E-A947-70E740481C1C}">
-                <a14:useLocalDpi xmlns:a14="http://schemas.microsoft.com/office/drawing/2010/main" val="0"/>
-              </a:ext>
-            </a:extLst>
-          </a:blip>
-          <a:stretch>
-            <a:fillRect/>
-          </a:stretch>
-        </p:blipFill>
-        <p:spPr>
-          <a:xfrm>
-            <a:off x="514033" y="2070178"/>
-            <a:ext cx="5022244" cy="4757043"/>
+            <a:off x="2090748" y="1405336"/>
+            <a:ext cx="9443259" cy="5221994"/>
           </a:xfrm>
           <a:prstGeom prst="rect">
             <a:avLst/>
@@ -14176,7 +13957,7 @@
     </p:spTree>
     <p:extLst>
       <p:ext uri="{BB962C8B-B14F-4D97-AF65-F5344CB8AC3E}">
-        <p14:creationId xmlns:p14="http://schemas.microsoft.com/office/powerpoint/2010/main" val="1728743676"/>
+        <p14:creationId xmlns:p14="http://schemas.microsoft.com/office/powerpoint/2010/main" val="4261792365"/>
       </p:ext>
     </p:extLst>
   </p:cSld>
@@ -14222,12 +14003,12 @@
         <p:spPr>
           <a:xfrm>
             <a:off x="299005" y="230670"/>
-            <a:ext cx="10258159" cy="610863"/>
+            <a:ext cx="9160879" cy="610863"/>
           </a:xfrm>
         </p:spPr>
         <p:txBody>
           <a:bodyPr vert="horz" lIns="0" tIns="0" rIns="0" bIns="0" rtlCol="0" anchor="b" anchorCtr="0">
-            <a:normAutofit fontScale="90000"/>
+            <a:normAutofit/>
           </a:bodyPr>
           <a:lstStyle/>
           <a:p>
@@ -14237,7 +14018,7 @@
                 <a:ea typeface="+mj-ea"/>
                 <a:cs typeface="+mj-cs"/>
               </a:rPr>
-              <a:t>Major Components of Greenhouse Gases</a:t>
+              <a:t>Fuel-Type</a:t>
             </a:r>
           </a:p>
         </p:txBody>
@@ -14276,17 +14057,60 @@
                 <a:ea typeface="+mn-ea"/>
                 <a:cs typeface="+mn-cs"/>
               </a:rPr>
-              <a:t>SOURCE</a:t>
-            </a:r>
+              <a:t>SOURCE &amp; END-USERS</a:t>
+            </a:r>
+          </a:p>
+          <a:p>
+            <a:endParaRPr lang="en-US" sz="2000" b="0" i="0" kern="1200" spc="0" baseline="0" dirty="0">
+              <a:latin typeface="+mj-lt"/>
+              <a:ea typeface="+mn-ea"/>
+              <a:cs typeface="+mn-cs"/>
+            </a:endParaRPr>
           </a:p>
         </p:txBody>
       </p:sp>
+      <p:pic>
+        <p:nvPicPr>
+          <p:cNvPr id="8" name="Picture 7" descr="Chart, pie chart&#10;&#10;Description automatically generated">
+            <a:extLst>
+              <a:ext uri="{FF2B5EF4-FFF2-40B4-BE49-F238E27FC236}">
+                <a16:creationId xmlns:a16="http://schemas.microsoft.com/office/drawing/2014/main" id="{D0214050-C5C3-672D-4A8B-730579C17B12}"/>
+              </a:ext>
+            </a:extLst>
+          </p:cNvPr>
+          <p:cNvPicPr>
+            <a:picLocks noChangeAspect="1"/>
+          </p:cNvPicPr>
+          <p:nvPr/>
+        </p:nvPicPr>
+        <p:blipFill>
+          <a:blip r:embed="rId2">
+            <a:extLst>
+              <a:ext uri="{28A0092B-C50C-407E-A947-70E740481C1C}">
+                <a14:useLocalDpi xmlns:a14="http://schemas.microsoft.com/office/drawing/2010/main" val="0"/>
+              </a:ext>
+            </a:extLst>
+          </a:blip>
+          <a:stretch>
+            <a:fillRect/>
+          </a:stretch>
+        </p:blipFill>
+        <p:spPr>
+          <a:xfrm>
+            <a:off x="416649" y="1613813"/>
+            <a:ext cx="5413826" cy="5127947"/>
+          </a:xfrm>
+          <a:prstGeom prst="rect">
+            <a:avLst/>
+          </a:prstGeom>
+        </p:spPr>
+      </p:pic>
       <p:sp>
         <p:nvSpPr>
-          <p:cNvPr id="2" name="Text Placeholder 2">
-            <a:extLst>
-              <a:ext uri="{FF2B5EF4-FFF2-40B4-BE49-F238E27FC236}">
-                <a16:creationId xmlns:a16="http://schemas.microsoft.com/office/drawing/2014/main" id="{77FB3898-A88B-7C5C-2B01-786A7C80AB65}"/>
+          <p:cNvPr id="9" name="Text Placeholder 43">
+            <a:extLst>
+              <a:ext uri="{FF2B5EF4-FFF2-40B4-BE49-F238E27FC236}">
+                <a16:creationId xmlns:a16="http://schemas.microsoft.com/office/drawing/2014/main" id="{FD87405A-E6F5-ACAD-D696-AEE2901A3FB0}"/>
               </a:ext>
             </a:extLst>
           </p:cNvPr>
@@ -14297,15 +14121,15 @@
         </p:nvSpPr>
         <p:spPr>
           <a:xfrm>
-            <a:off x="6284376" y="1297898"/>
-            <a:ext cx="4838700" cy="315915"/>
+            <a:off x="6687416" y="1730053"/>
+            <a:ext cx="6055369" cy="370904"/>
           </a:xfrm>
           <a:prstGeom prst="rect">
             <a:avLst/>
           </a:prstGeom>
         </p:spPr>
         <p:txBody>
-          <a:bodyPr vert="horz" lIns="91440" tIns="45720" rIns="91440" bIns="45720" rtlCol="0" anchorCtr="0">
+          <a:bodyPr vert="horz" lIns="91440" tIns="45720" rIns="91440" bIns="45720" rtlCol="0">
             <a:noAutofit/>
           </a:bodyPr>
           <a:lstStyle>
@@ -14318,16 +14142,16 @@
               </a:spcBef>
               <a:buFont typeface="Arial" panose="020B0604020202020204" pitchFamily="34" charset="0"/>
               <a:buNone/>
-              <a:defRPr sz="1800" b="0" i="0" kern="1200" spc="0" baseline="0">
-                <a:solidFill>
-                  <a:schemeClr val="tx2"/>
-                </a:solidFill>
-                <a:latin typeface="+mj-lt"/>
+              <a:defRPr sz="1600" b="0" i="0" kern="1200">
+                <a:solidFill>
+                  <a:schemeClr val="bg1"/>
+                </a:solidFill>
+                <a:latin typeface="+mn-lt"/>
                 <a:ea typeface="+mn-ea"/>
                 <a:cs typeface="+mn-cs"/>
               </a:defRPr>
             </a:lvl1pPr>
-            <a:lvl2pPr marL="457200" indent="0" algn="l" defTabSz="914400" rtl="0" eaLnBrk="1" latinLnBrk="0" hangingPunct="1">
+            <a:lvl2pPr marL="685800" indent="-228600" algn="l" defTabSz="914400" rtl="0" eaLnBrk="1" latinLnBrk="0" hangingPunct="1">
               <a:lnSpc>
                 <a:spcPct val="90000"/>
               </a:lnSpc>
@@ -14335,8 +14159,8 @@
                 <a:spcPts val="500"/>
               </a:spcBef>
               <a:buFont typeface="Arial" panose="020B0604020202020204" pitchFamily="34" charset="0"/>
-              <a:buNone/>
-              <a:defRPr sz="2000" b="1" i="0" kern="1200">
+              <a:buChar char="•"/>
+              <a:defRPr sz="2400" b="0" i="0" kern="1200">
                 <a:solidFill>
                   <a:schemeClr val="bg1"/>
                 </a:solidFill>
@@ -14345,7 +14169,7 @@
                 <a:cs typeface="+mn-cs"/>
               </a:defRPr>
             </a:lvl2pPr>
-            <a:lvl3pPr marL="914400" indent="0" algn="l" defTabSz="914400" rtl="0" eaLnBrk="1" latinLnBrk="0" hangingPunct="1">
+            <a:lvl3pPr marL="1143000" indent="-228600" algn="l" defTabSz="914400" rtl="0" eaLnBrk="1" latinLnBrk="0" hangingPunct="1">
               <a:lnSpc>
                 <a:spcPct val="90000"/>
               </a:lnSpc>
@@ -14353,8 +14177,8 @@
                 <a:spcPts val="500"/>
               </a:spcBef>
               <a:buFont typeface="Arial" panose="020B0604020202020204" pitchFamily="34" charset="0"/>
-              <a:buNone/>
-              <a:defRPr sz="1800" b="1" i="0" kern="1200">
+              <a:buChar char="•"/>
+              <a:defRPr sz="2000" b="0" i="0" kern="1200">
                 <a:solidFill>
                   <a:schemeClr val="bg1"/>
                 </a:solidFill>
@@ -14363,7 +14187,7 @@
                 <a:cs typeface="+mn-cs"/>
               </a:defRPr>
             </a:lvl3pPr>
-            <a:lvl4pPr marL="1371600" indent="0" algn="l" defTabSz="914400" rtl="0" eaLnBrk="1" latinLnBrk="0" hangingPunct="1">
+            <a:lvl4pPr marL="1600200" indent="-228600" algn="l" defTabSz="914400" rtl="0" eaLnBrk="1" latinLnBrk="0" hangingPunct="1">
               <a:lnSpc>
                 <a:spcPct val="90000"/>
               </a:lnSpc>
@@ -14371,8 +14195,8 @@
                 <a:spcPts val="500"/>
               </a:spcBef>
               <a:buFont typeface="Arial" panose="020B0604020202020204" pitchFamily="34" charset="0"/>
-              <a:buNone/>
-              <a:defRPr sz="1600" b="1" i="0" kern="1200">
+              <a:buChar char="•"/>
+              <a:defRPr sz="1800" b="0" i="0" kern="1200">
                 <a:solidFill>
                   <a:schemeClr val="bg1"/>
                 </a:solidFill>
@@ -14381,7 +14205,7 @@
                 <a:cs typeface="+mn-cs"/>
               </a:defRPr>
             </a:lvl4pPr>
-            <a:lvl5pPr marL="1828800" indent="0" algn="l" defTabSz="914400" rtl="0" eaLnBrk="1" latinLnBrk="0" hangingPunct="1">
+            <a:lvl5pPr marL="2057400" indent="-228600" algn="l" defTabSz="914400" rtl="0" eaLnBrk="1" latinLnBrk="0" hangingPunct="1">
               <a:lnSpc>
                 <a:spcPct val="90000"/>
               </a:lnSpc>
@@ -14389,8 +14213,8 @@
                 <a:spcPts val="500"/>
               </a:spcBef>
               <a:buFont typeface="Arial" panose="020B0604020202020204" pitchFamily="34" charset="0"/>
-              <a:buNone/>
-              <a:defRPr sz="1600" b="1" i="0" kern="1200">
+              <a:buChar char="•"/>
+              <a:defRPr sz="1800" b="0" i="0" kern="1200">
                 <a:solidFill>
                   <a:schemeClr val="bg1"/>
                 </a:solidFill>
@@ -14399,7 +14223,7 @@
                 <a:cs typeface="+mn-cs"/>
               </a:defRPr>
             </a:lvl5pPr>
-            <a:lvl6pPr marL="2286000" indent="0" algn="l" defTabSz="914400" rtl="0" eaLnBrk="1" latinLnBrk="0" hangingPunct="1">
+            <a:lvl6pPr marL="2514600" indent="-228600" algn="l" defTabSz="914400" rtl="0" eaLnBrk="1" latinLnBrk="0" hangingPunct="1">
               <a:lnSpc>
                 <a:spcPct val="90000"/>
               </a:lnSpc>
@@ -14407,8 +14231,8 @@
                 <a:spcPts val="500"/>
               </a:spcBef>
               <a:buFont typeface="Arial" panose="020B0604020202020204" pitchFamily="34" charset="0"/>
-              <a:buNone/>
-              <a:defRPr sz="1600" b="1" kern="1200">
+              <a:buChar char="•"/>
+              <a:defRPr sz="1800" kern="1200">
                 <a:solidFill>
                   <a:schemeClr val="tx1"/>
                 </a:solidFill>
@@ -14417,7 +14241,7 @@
                 <a:cs typeface="+mn-cs"/>
               </a:defRPr>
             </a:lvl6pPr>
-            <a:lvl7pPr marL="2743200" indent="0" algn="l" defTabSz="914400" rtl="0" eaLnBrk="1" latinLnBrk="0" hangingPunct="1">
+            <a:lvl7pPr marL="2971800" indent="-228600" algn="l" defTabSz="914400" rtl="0" eaLnBrk="1" latinLnBrk="0" hangingPunct="1">
               <a:lnSpc>
                 <a:spcPct val="90000"/>
               </a:lnSpc>
@@ -14425,8 +14249,8 @@
                 <a:spcPts val="500"/>
               </a:spcBef>
               <a:buFont typeface="Arial" panose="020B0604020202020204" pitchFamily="34" charset="0"/>
-              <a:buNone/>
-              <a:defRPr sz="1600" b="1" kern="1200">
+              <a:buChar char="•"/>
+              <a:defRPr sz="1800" kern="1200">
                 <a:solidFill>
                   <a:schemeClr val="tx1"/>
                 </a:solidFill>
@@ -14435,7 +14259,7 @@
                 <a:cs typeface="+mn-cs"/>
               </a:defRPr>
             </a:lvl7pPr>
-            <a:lvl8pPr marL="3200400" indent="0" algn="l" defTabSz="914400" rtl="0" eaLnBrk="1" latinLnBrk="0" hangingPunct="1">
+            <a:lvl8pPr marL="3429000" indent="-228600" algn="l" defTabSz="914400" rtl="0" eaLnBrk="1" latinLnBrk="0" hangingPunct="1">
               <a:lnSpc>
                 <a:spcPct val="90000"/>
               </a:lnSpc>
@@ -14443,8 +14267,8 @@
                 <a:spcPts val="500"/>
               </a:spcBef>
               <a:buFont typeface="Arial" panose="020B0604020202020204" pitchFamily="34" charset="0"/>
-              <a:buNone/>
-              <a:defRPr sz="1600" b="1" kern="1200">
+              <a:buChar char="•"/>
+              <a:defRPr sz="1800" kern="1200">
                 <a:solidFill>
                   <a:schemeClr val="tx1"/>
                 </a:solidFill>
@@ -14453,7 +14277,7 @@
                 <a:cs typeface="+mn-cs"/>
               </a:defRPr>
             </a:lvl8pPr>
-            <a:lvl9pPr marL="3657600" indent="0" algn="l" defTabSz="914400" rtl="0" eaLnBrk="1" latinLnBrk="0" hangingPunct="1">
+            <a:lvl9pPr marL="3886200" indent="-228600" algn="l" defTabSz="914400" rtl="0" eaLnBrk="1" latinLnBrk="0" hangingPunct="1">
               <a:lnSpc>
                 <a:spcPct val="90000"/>
               </a:lnSpc>
@@ -14461,8 +14285,8 @@
                 <a:spcPts val="500"/>
               </a:spcBef>
               <a:buFont typeface="Arial" panose="020B0604020202020204" pitchFamily="34" charset="0"/>
-              <a:buNone/>
-              <a:defRPr sz="1600" b="1" kern="1200">
+              <a:buChar char="•"/>
+              <a:defRPr sz="1800" kern="1200">
                 <a:solidFill>
                   <a:schemeClr val="tx1"/>
                 </a:solidFill>
@@ -14473,94 +14297,91 @@
             </a:lvl9pPr>
           </a:lstStyle>
           <a:p>
-            <a:pPr marL="228600" indent="-228600"/>
-            <a:r>
-              <a:rPr lang="en-US" b="0" i="0" kern="1200" spc="0" baseline="0" dirty="0">
-                <a:latin typeface="+mj-lt"/>
-                <a:ea typeface="+mn-ea"/>
-                <a:cs typeface="+mn-cs"/>
+            <a:r>
+              <a:rPr lang="en-GB" sz="1800" dirty="0">
+                <a:solidFill>
+                  <a:srgbClr val="FF0000"/>
+                </a:solidFill>
               </a:rPr>
-              <a:t>END-USERS</a:t>
+              <a:t>Other Emissions include</a:t>
+            </a:r>
+            <a:r>
+              <a:rPr lang="en-GB" sz="1800" dirty="0"/>
+              <a:t> –</a:t>
+            </a:r>
+          </a:p>
+          <a:p>
+            <a:r>
+              <a:rPr lang="en-GB" sz="1800" dirty="0"/>
+              <a:t>Cattle, Horses, Pig and Poultry wastes</a:t>
+            </a:r>
+          </a:p>
+          <a:p>
+            <a:r>
+              <a:rPr lang="en-GB" sz="1800" dirty="0"/>
+              <a:t>Soil emission (both direct and indirect),</a:t>
+            </a:r>
+          </a:p>
+          <a:p>
+            <a:r>
+              <a:rPr lang="en-GB" sz="1800" dirty="0"/>
+              <a:t>Refrigeration and air conditioning,</a:t>
+            </a:r>
+          </a:p>
+          <a:p>
+            <a:r>
+              <a:rPr lang="en-GB" sz="1800" dirty="0"/>
+              <a:t>Waste incineration,</a:t>
+            </a:r>
+          </a:p>
+          <a:p>
+            <a:r>
+              <a:rPr lang="en-GB" sz="1800" dirty="0"/>
+              <a:t>Glass Production,</a:t>
+            </a:r>
+          </a:p>
+          <a:p>
+            <a:r>
+              <a:rPr lang="en-GB" sz="1800" dirty="0"/>
+              <a:t>Gas flare,</a:t>
+            </a:r>
+          </a:p>
+          <a:p>
+            <a:r>
+              <a:rPr lang="en-GB" sz="1800" dirty="0"/>
+              <a:t>Chemical Industries, </a:t>
+            </a:r>
+          </a:p>
+          <a:p>
+            <a:r>
+              <a:rPr lang="en-GB" sz="1800" dirty="0"/>
+              <a:t>Power stations, </a:t>
+            </a:r>
+          </a:p>
+          <a:p>
+            <a:r>
+              <a:rPr lang="en-GB" sz="1800" dirty="0"/>
+              <a:t>Drainage of organic soils - settlements</a:t>
+            </a:r>
+          </a:p>
+          <a:p>
+            <a:r>
+              <a:rPr lang="en-GB" sz="1800" dirty="0"/>
+              <a:t>Industrial combustion, </a:t>
+            </a:r>
+          </a:p>
+          <a:p>
+            <a:r>
+              <a:rPr lang="en-GB" sz="1800" dirty="0"/>
+              <a:t>Manufacture of solid fuels and other energy industries.</a:t>
             </a:r>
           </a:p>
         </p:txBody>
       </p:sp>
-      <p:pic>
-        <p:nvPicPr>
-          <p:cNvPr id="4" name="Picture 3" descr="Chart, pie chart&#10;&#10;Description automatically generated">
-            <a:extLst>
-              <a:ext uri="{FF2B5EF4-FFF2-40B4-BE49-F238E27FC236}">
-                <a16:creationId xmlns:a16="http://schemas.microsoft.com/office/drawing/2014/main" id="{71E82EB2-9FBB-1DFF-14DC-CDF9C9C11D94}"/>
-              </a:ext>
-            </a:extLst>
-          </p:cNvPr>
-          <p:cNvPicPr>
-            <a:picLocks noChangeAspect="1"/>
-          </p:cNvPicPr>
-          <p:nvPr/>
-        </p:nvPicPr>
-        <p:blipFill>
-          <a:blip r:embed="rId2">
-            <a:extLst>
-              <a:ext uri="{28A0092B-C50C-407E-A947-70E740481C1C}">
-                <a14:useLocalDpi xmlns:a14="http://schemas.microsoft.com/office/drawing/2010/main" val="0"/>
-              </a:ext>
-            </a:extLst>
-          </a:blip>
-          <a:stretch>
-            <a:fillRect/>
-          </a:stretch>
-        </p:blipFill>
-        <p:spPr>
-          <a:xfrm>
-            <a:off x="299005" y="2151845"/>
-            <a:ext cx="5392117" cy="4732530"/>
-          </a:xfrm>
-          <a:prstGeom prst="rect">
-            <a:avLst/>
-          </a:prstGeom>
-        </p:spPr>
-      </p:pic>
-      <p:pic>
-        <p:nvPicPr>
-          <p:cNvPr id="7" name="Picture 6" descr="Chart, pie chart&#10;&#10;Description automatically generated">
-            <a:extLst>
-              <a:ext uri="{FF2B5EF4-FFF2-40B4-BE49-F238E27FC236}">
-                <a16:creationId xmlns:a16="http://schemas.microsoft.com/office/drawing/2014/main" id="{7AA3A5B0-FBDF-FE3C-E52B-707ECF74C13B}"/>
-              </a:ext>
-            </a:extLst>
-          </p:cNvPr>
-          <p:cNvPicPr>
-            <a:picLocks noChangeAspect="1"/>
-          </p:cNvPicPr>
-          <p:nvPr/>
-        </p:nvPicPr>
-        <p:blipFill>
-          <a:blip r:embed="rId3">
-            <a:extLst>
-              <a:ext uri="{28A0092B-C50C-407E-A947-70E740481C1C}">
-                <a14:useLocalDpi xmlns:a14="http://schemas.microsoft.com/office/drawing/2010/main" val="0"/>
-              </a:ext>
-            </a:extLst>
-          </a:blip>
-          <a:stretch>
-            <a:fillRect/>
-          </a:stretch>
-        </p:blipFill>
-        <p:spPr>
-          <a:xfrm>
-            <a:off x="6096000" y="2125470"/>
-            <a:ext cx="5392117" cy="4732530"/>
-          </a:xfrm>
-          <a:prstGeom prst="rect">
-            <a:avLst/>
-          </a:prstGeom>
-        </p:spPr>
-      </p:pic>
     </p:spTree>
     <p:extLst>
       <p:ext uri="{BB962C8B-B14F-4D97-AF65-F5344CB8AC3E}">
-        <p14:creationId xmlns:p14="http://schemas.microsoft.com/office/powerpoint/2010/main" val="3514829862"/>
+        <p14:creationId xmlns:p14="http://schemas.microsoft.com/office/powerpoint/2010/main" val="1728743676"/>
       </p:ext>
     </p:extLst>
   </p:cSld>
@@ -14589,38 +14410,10 @@
       </p:grpSpPr>
       <p:sp>
         <p:nvSpPr>
-          <p:cNvPr id="2" name="Title 1">
-            <a:extLst>
-              <a:ext uri="{FF2B5EF4-FFF2-40B4-BE49-F238E27FC236}">
-                <a16:creationId xmlns:a16="http://schemas.microsoft.com/office/drawing/2014/main" id="{8C122DF8-59D4-D94D-8ED9-F2F319899DBF}"/>
-              </a:ext>
-            </a:extLst>
-          </p:cNvPr>
-          <p:cNvSpPr>
-            <a:spLocks noGrp="1"/>
-          </p:cNvSpPr>
-          <p:nvPr>
-            <p:ph type="title"/>
-          </p:nvPr>
-        </p:nvSpPr>
-        <p:spPr/>
-        <p:txBody>
-          <a:bodyPr/>
-          <a:lstStyle/>
-          <a:p>
-            <a:r>
-              <a:rPr lang="en-US" dirty="0"/>
-              <a:t>CLOSING</a:t>
-            </a:r>
-          </a:p>
-        </p:txBody>
-      </p:sp>
-      <p:sp>
-        <p:nvSpPr>
-          <p:cNvPr id="45" name="Text Placeholder 44">
-            <a:extLst>
-              <a:ext uri="{FF2B5EF4-FFF2-40B4-BE49-F238E27FC236}">
-                <a16:creationId xmlns:a16="http://schemas.microsoft.com/office/drawing/2014/main" id="{803A1E73-C790-447A-974F-B3ADB50149F7}"/>
+          <p:cNvPr id="29" name="Text Placeholder 2">
+            <a:extLst>
+              <a:ext uri="{FF2B5EF4-FFF2-40B4-BE49-F238E27FC236}">
+                <a16:creationId xmlns:a16="http://schemas.microsoft.com/office/drawing/2014/main" id="{312D0CA8-06AF-65A2-2490-C577E53226E1}"/>
               </a:ext>
             </a:extLst>
           </p:cNvPr>
@@ -14631,377 +14424,580 @@
             <p:ph type="body" sz="quarter" idx="12"/>
           </p:nvPr>
         </p:nvSpPr>
-        <p:spPr/>
+        <p:spPr>
+          <a:xfrm>
+            <a:off x="852748" y="1297898"/>
+            <a:ext cx="4838700" cy="315915"/>
+          </a:xfrm>
+        </p:spPr>
         <p:txBody>
-          <a:bodyPr/>
+          <a:bodyPr vert="horz" lIns="91440" tIns="45720" rIns="91440" bIns="45720" rtlCol="0">
+            <a:noAutofit/>
+          </a:bodyPr>
           <a:lstStyle/>
           <a:p>
             <a:r>
-              <a:rPr lang="en-US" dirty="0"/>
-              <a:t>WHO - SECTOR</a:t>
+              <a:rPr lang="en-US" sz="2000" b="0" i="0" kern="1200" spc="0" baseline="0" dirty="0">
+                <a:latin typeface="+mj-lt"/>
+                <a:ea typeface="+mn-ea"/>
+                <a:cs typeface="+mn-cs"/>
+              </a:rPr>
+              <a:t>SOURCE &amp; END-USERS</a:t>
             </a:r>
           </a:p>
         </p:txBody>
       </p:sp>
       <p:sp>
         <p:nvSpPr>
-          <p:cNvPr id="44" name="Text Placeholder 43">
-            <a:extLst>
-              <a:ext uri="{FF2B5EF4-FFF2-40B4-BE49-F238E27FC236}">
-                <a16:creationId xmlns:a16="http://schemas.microsoft.com/office/drawing/2014/main" id="{906E4DF9-127F-4650-8BAA-2521A37885B0}"/>
-              </a:ext>
-            </a:extLst>
-          </p:cNvPr>
-          <p:cNvSpPr>
-            <a:spLocks noGrp="1"/>
+          <p:cNvPr id="8" name="Text Placeholder 43">
+            <a:extLst>
+              <a:ext uri="{FF2B5EF4-FFF2-40B4-BE49-F238E27FC236}">
+                <a16:creationId xmlns:a16="http://schemas.microsoft.com/office/drawing/2014/main" id="{EDAF81FA-24A5-E785-1FC3-453AB861D96F}"/>
+              </a:ext>
+            </a:extLst>
+          </p:cNvPr>
+          <p:cNvSpPr txBox="1">
+            <a:spLocks/>
           </p:cNvSpPr>
-          <p:nvPr>
-            <p:ph type="body" sz="quarter" idx="10"/>
-          </p:nvPr>
-        </p:nvSpPr>
-        <p:spPr/>
-        <p:txBody>
-          <a:bodyPr/>
-          <a:lstStyle/>
-          <a:p>
-            <a:r>
-              <a:rPr lang="en-US" dirty="0"/>
-              <a:t>who</a:t>
-            </a:r>
-          </a:p>
-        </p:txBody>
-      </p:sp>
-      <p:sp>
-        <p:nvSpPr>
-          <p:cNvPr id="47" name="Text Placeholder 46">
-            <a:extLst>
-              <a:ext uri="{FF2B5EF4-FFF2-40B4-BE49-F238E27FC236}">
-                <a16:creationId xmlns:a16="http://schemas.microsoft.com/office/drawing/2014/main" id="{DDA232CE-EB44-41DD-920C-AEDD5C33D2A5}"/>
-              </a:ext>
-            </a:extLst>
-          </p:cNvPr>
-          <p:cNvSpPr>
-            <a:spLocks noGrp="1"/>
-          </p:cNvSpPr>
-          <p:nvPr>
-            <p:ph type="body" sz="quarter" idx="14"/>
-          </p:nvPr>
-        </p:nvSpPr>
-        <p:spPr/>
-        <p:txBody>
-          <a:bodyPr/>
-          <a:lstStyle/>
-          <a:p>
-            <a:r>
-              <a:rPr lang="en-US" dirty="0"/>
-              <a:t>WHO – END USER</a:t>
-            </a:r>
-          </a:p>
-        </p:txBody>
-      </p:sp>
-      <p:sp>
-        <p:nvSpPr>
-          <p:cNvPr id="46" name="Text Placeholder 45">
-            <a:extLst>
-              <a:ext uri="{FF2B5EF4-FFF2-40B4-BE49-F238E27FC236}">
-                <a16:creationId xmlns:a16="http://schemas.microsoft.com/office/drawing/2014/main" id="{A09D80D2-95FB-43C6-96F8-7EF7737C28BA}"/>
-              </a:ext>
-            </a:extLst>
-          </p:cNvPr>
-          <p:cNvSpPr>
-            <a:spLocks noGrp="1"/>
-          </p:cNvSpPr>
-          <p:nvPr>
-            <p:ph type="body" sz="quarter" idx="13"/>
-          </p:nvPr>
-        </p:nvSpPr>
-        <p:spPr/>
-        <p:txBody>
-          <a:bodyPr/>
-          <a:lstStyle/>
-          <a:p>
-            <a:r>
-              <a:rPr lang="en-US" dirty="0"/>
-              <a:t>who</a:t>
-            </a:r>
-          </a:p>
-        </p:txBody>
-      </p:sp>
-      <p:sp>
-        <p:nvSpPr>
-          <p:cNvPr id="49" name="Text Placeholder 48">
-            <a:extLst>
-              <a:ext uri="{FF2B5EF4-FFF2-40B4-BE49-F238E27FC236}">
-                <a16:creationId xmlns:a16="http://schemas.microsoft.com/office/drawing/2014/main" id="{ED796758-F31D-4250-A439-D6DE9523C88B}"/>
-              </a:ext>
-            </a:extLst>
-          </p:cNvPr>
-          <p:cNvSpPr>
-            <a:spLocks noGrp="1"/>
-          </p:cNvSpPr>
-          <p:nvPr>
-            <p:ph type="body" sz="quarter" idx="16"/>
-          </p:nvPr>
-        </p:nvSpPr>
-        <p:spPr/>
-        <p:txBody>
-          <a:bodyPr/>
-          <a:lstStyle/>
-          <a:p>
-            <a:r>
-              <a:rPr lang="en-US" dirty="0"/>
-              <a:t>WHAT</a:t>
-            </a:r>
-          </a:p>
-        </p:txBody>
-      </p:sp>
-      <p:sp>
-        <p:nvSpPr>
-          <p:cNvPr id="48" name="Text Placeholder 47">
-            <a:extLst>
-              <a:ext uri="{FF2B5EF4-FFF2-40B4-BE49-F238E27FC236}">
-                <a16:creationId xmlns:a16="http://schemas.microsoft.com/office/drawing/2014/main" id="{CEBFC0C0-C506-47F0-AE21-8A46DB86644A}"/>
-              </a:ext>
-            </a:extLst>
-          </p:cNvPr>
-          <p:cNvSpPr>
-            <a:spLocks noGrp="1"/>
-          </p:cNvSpPr>
-          <p:nvPr>
-            <p:ph type="body" sz="quarter" idx="15"/>
-          </p:nvPr>
-        </p:nvSpPr>
-        <p:spPr/>
-        <p:txBody>
-          <a:bodyPr/>
-          <a:lstStyle/>
-          <a:p>
-            <a:r>
-              <a:rPr lang="en-US" dirty="0"/>
-              <a:t>what</a:t>
-            </a:r>
-          </a:p>
-        </p:txBody>
-      </p:sp>
-      <p:sp>
-        <p:nvSpPr>
-          <p:cNvPr id="51" name="Text Placeholder 50">
-            <a:extLst>
-              <a:ext uri="{FF2B5EF4-FFF2-40B4-BE49-F238E27FC236}">
-                <a16:creationId xmlns:a16="http://schemas.microsoft.com/office/drawing/2014/main" id="{D582AC9C-B267-4C04-9E50-051DE433538C}"/>
-              </a:ext>
-            </a:extLst>
-          </p:cNvPr>
-          <p:cNvSpPr>
-            <a:spLocks noGrp="1"/>
-          </p:cNvSpPr>
-          <p:nvPr>
-            <p:ph type="body" sz="quarter" idx="18"/>
-          </p:nvPr>
-        </p:nvSpPr>
-        <p:spPr/>
-        <p:txBody>
-          <a:bodyPr/>
-          <a:lstStyle/>
-          <a:p>
-            <a:r>
-              <a:rPr lang="en-US" dirty="0"/>
-              <a:t>WHEN</a:t>
-            </a:r>
-          </a:p>
-        </p:txBody>
-      </p:sp>
-      <p:sp>
-        <p:nvSpPr>
-          <p:cNvPr id="50" name="Text Placeholder 49">
-            <a:extLst>
-              <a:ext uri="{FF2B5EF4-FFF2-40B4-BE49-F238E27FC236}">
-                <a16:creationId xmlns:a16="http://schemas.microsoft.com/office/drawing/2014/main" id="{C60A09F8-DA84-487F-81AC-337BE4A9F35B}"/>
-              </a:ext>
-            </a:extLst>
-          </p:cNvPr>
-          <p:cNvSpPr>
-            <a:spLocks noGrp="1"/>
-          </p:cNvSpPr>
-          <p:nvPr>
-            <p:ph type="body" sz="quarter" idx="17"/>
-          </p:nvPr>
-        </p:nvSpPr>
-        <p:spPr/>
-        <p:txBody>
-          <a:bodyPr/>
-          <a:lstStyle/>
-          <a:p>
-            <a:r>
-              <a:rPr lang="en-US" dirty="0"/>
-              <a:t>when</a:t>
-            </a:r>
-          </a:p>
-        </p:txBody>
-      </p:sp>
-      <p:sp>
-        <p:nvSpPr>
-          <p:cNvPr id="53" name="Text Placeholder 52">
-            <a:extLst>
-              <a:ext uri="{FF2B5EF4-FFF2-40B4-BE49-F238E27FC236}">
-                <a16:creationId xmlns:a16="http://schemas.microsoft.com/office/drawing/2014/main" id="{A1B673DD-4FEC-4191-8446-77B89805FF2B}"/>
-              </a:ext>
-            </a:extLst>
-          </p:cNvPr>
-          <p:cNvSpPr>
-            <a:spLocks noGrp="1"/>
-          </p:cNvSpPr>
-          <p:nvPr>
-            <p:ph type="body" sz="quarter" idx="20"/>
-          </p:nvPr>
-        </p:nvSpPr>
-        <p:spPr/>
-        <p:txBody>
-          <a:bodyPr/>
-          <a:lstStyle/>
-          <a:p>
-            <a:r>
-              <a:rPr lang="en-US" dirty="0"/>
-              <a:t>CONCLUSION</a:t>
-            </a:r>
-          </a:p>
-        </p:txBody>
-      </p:sp>
-      <p:sp>
-        <p:nvSpPr>
-          <p:cNvPr id="52" name="Text Placeholder 51">
-            <a:extLst>
-              <a:ext uri="{FF2B5EF4-FFF2-40B4-BE49-F238E27FC236}">
-                <a16:creationId xmlns:a16="http://schemas.microsoft.com/office/drawing/2014/main" id="{1E84004F-53E7-47E5-A493-1980475C42D4}"/>
-              </a:ext>
-            </a:extLst>
-          </p:cNvPr>
-          <p:cNvSpPr>
-            <a:spLocks noGrp="1"/>
-          </p:cNvSpPr>
-          <p:nvPr>
-            <p:ph type="body" sz="quarter" idx="19"/>
-          </p:nvPr>
-        </p:nvSpPr>
-        <p:spPr/>
-        <p:txBody>
-          <a:bodyPr/>
-          <a:lstStyle/>
-          <a:p>
-            <a:r>
-              <a:rPr lang="en-US" dirty="0"/>
-              <a:t>conclusion</a:t>
-            </a:r>
-          </a:p>
-        </p:txBody>
-      </p:sp>
-      <p:sp>
-        <p:nvSpPr>
-          <p:cNvPr id="5" name="Slide Number Placeholder 4">
-            <a:extLst>
-              <a:ext uri="{FF2B5EF4-FFF2-40B4-BE49-F238E27FC236}">
-                <a16:creationId xmlns:a16="http://schemas.microsoft.com/office/drawing/2014/main" id="{AB744071-0CE2-7746-9315-22EC28A0F462}"/>
-              </a:ext>
-            </a:extLst>
-          </p:cNvPr>
-          <p:cNvSpPr>
-            <a:spLocks noGrp="1"/>
-          </p:cNvSpPr>
-          <p:nvPr>
-            <p:ph type="sldNum" sz="quarter" idx="23"/>
-          </p:nvPr>
+          <p:nvPr/>
         </p:nvSpPr>
         <p:spPr>
           <a:xfrm>
-            <a:off x="971550" y="6332220"/>
-            <a:ext cx="523240" cy="247651"/>
+            <a:off x="5691448" y="1613813"/>
+            <a:ext cx="5367647" cy="4478229"/>
           </a:xfrm>
+          <a:prstGeom prst="rect">
+            <a:avLst/>
+          </a:prstGeom>
         </p:spPr>
         <p:txBody>
-          <a:bodyPr/>
-          <a:lstStyle/>
-          <a:p>
-            <a:fld id="{294A09A9-5501-47C1-A89A-A340965A2BE2}" type="slidenum">
-              <a:rPr lang="en-US" smtClean="0"/>
-              <a:pPr/>
-              <a:t>13</a:t>
-            </a:fld>
-            <a:endParaRPr lang="en-US" dirty="0"/>
+          <a:bodyPr vert="horz" lIns="91440" tIns="45720" rIns="91440" bIns="45720" rtlCol="0">
+            <a:noAutofit/>
+          </a:bodyPr>
+          <a:lstStyle>
+            <a:lvl1pPr marL="0" indent="0" algn="l" defTabSz="914400" rtl="0" eaLnBrk="1" latinLnBrk="0" hangingPunct="1">
+              <a:lnSpc>
+                <a:spcPct val="90000"/>
+              </a:lnSpc>
+              <a:spcBef>
+                <a:spcPts val="1000"/>
+              </a:spcBef>
+              <a:buFont typeface="Arial" panose="020B0604020202020204" pitchFamily="34" charset="0"/>
+              <a:buNone/>
+              <a:defRPr sz="1600" b="0" i="0" kern="1200">
+                <a:solidFill>
+                  <a:schemeClr val="bg1"/>
+                </a:solidFill>
+                <a:latin typeface="+mn-lt"/>
+                <a:ea typeface="+mn-ea"/>
+                <a:cs typeface="+mn-cs"/>
+              </a:defRPr>
+            </a:lvl1pPr>
+            <a:lvl2pPr marL="685800" indent="-228600" algn="l" defTabSz="914400" rtl="0" eaLnBrk="1" latinLnBrk="0" hangingPunct="1">
+              <a:lnSpc>
+                <a:spcPct val="90000"/>
+              </a:lnSpc>
+              <a:spcBef>
+                <a:spcPts val="500"/>
+              </a:spcBef>
+              <a:buFont typeface="Arial" panose="020B0604020202020204" pitchFamily="34" charset="0"/>
+              <a:buChar char="•"/>
+              <a:defRPr sz="2400" b="0" i="0" kern="1200">
+                <a:solidFill>
+                  <a:schemeClr val="bg1"/>
+                </a:solidFill>
+                <a:latin typeface="+mn-lt"/>
+                <a:ea typeface="+mn-ea"/>
+                <a:cs typeface="+mn-cs"/>
+              </a:defRPr>
+            </a:lvl2pPr>
+            <a:lvl3pPr marL="1143000" indent="-228600" algn="l" defTabSz="914400" rtl="0" eaLnBrk="1" latinLnBrk="0" hangingPunct="1">
+              <a:lnSpc>
+                <a:spcPct val="90000"/>
+              </a:lnSpc>
+              <a:spcBef>
+                <a:spcPts val="500"/>
+              </a:spcBef>
+              <a:buFont typeface="Arial" panose="020B0604020202020204" pitchFamily="34" charset="0"/>
+              <a:buChar char="•"/>
+              <a:defRPr sz="2000" b="0" i="0" kern="1200">
+                <a:solidFill>
+                  <a:schemeClr val="bg1"/>
+                </a:solidFill>
+                <a:latin typeface="+mn-lt"/>
+                <a:ea typeface="+mn-ea"/>
+                <a:cs typeface="+mn-cs"/>
+              </a:defRPr>
+            </a:lvl3pPr>
+            <a:lvl4pPr marL="1600200" indent="-228600" algn="l" defTabSz="914400" rtl="0" eaLnBrk="1" latinLnBrk="0" hangingPunct="1">
+              <a:lnSpc>
+                <a:spcPct val="90000"/>
+              </a:lnSpc>
+              <a:spcBef>
+                <a:spcPts val="500"/>
+              </a:spcBef>
+              <a:buFont typeface="Arial" panose="020B0604020202020204" pitchFamily="34" charset="0"/>
+              <a:buChar char="•"/>
+              <a:defRPr sz="1800" b="0" i="0" kern="1200">
+                <a:solidFill>
+                  <a:schemeClr val="bg1"/>
+                </a:solidFill>
+                <a:latin typeface="+mn-lt"/>
+                <a:ea typeface="+mn-ea"/>
+                <a:cs typeface="+mn-cs"/>
+              </a:defRPr>
+            </a:lvl4pPr>
+            <a:lvl5pPr marL="2057400" indent="-228600" algn="l" defTabSz="914400" rtl="0" eaLnBrk="1" latinLnBrk="0" hangingPunct="1">
+              <a:lnSpc>
+                <a:spcPct val="90000"/>
+              </a:lnSpc>
+              <a:spcBef>
+                <a:spcPts val="500"/>
+              </a:spcBef>
+              <a:buFont typeface="Arial" panose="020B0604020202020204" pitchFamily="34" charset="0"/>
+              <a:buChar char="•"/>
+              <a:defRPr sz="1800" b="0" i="0" kern="1200">
+                <a:solidFill>
+                  <a:schemeClr val="bg1"/>
+                </a:solidFill>
+                <a:latin typeface="+mn-lt"/>
+                <a:ea typeface="+mn-ea"/>
+                <a:cs typeface="+mn-cs"/>
+              </a:defRPr>
+            </a:lvl5pPr>
+            <a:lvl6pPr marL="2514600" indent="-228600" algn="l" defTabSz="914400" rtl="0" eaLnBrk="1" latinLnBrk="0" hangingPunct="1">
+              <a:lnSpc>
+                <a:spcPct val="90000"/>
+              </a:lnSpc>
+              <a:spcBef>
+                <a:spcPts val="500"/>
+              </a:spcBef>
+              <a:buFont typeface="Arial" panose="020B0604020202020204" pitchFamily="34" charset="0"/>
+              <a:buChar char="•"/>
+              <a:defRPr sz="1800" kern="1200">
+                <a:solidFill>
+                  <a:schemeClr val="tx1"/>
+                </a:solidFill>
+                <a:latin typeface="+mn-lt"/>
+                <a:ea typeface="+mn-ea"/>
+                <a:cs typeface="+mn-cs"/>
+              </a:defRPr>
+            </a:lvl6pPr>
+            <a:lvl7pPr marL="2971800" indent="-228600" algn="l" defTabSz="914400" rtl="0" eaLnBrk="1" latinLnBrk="0" hangingPunct="1">
+              <a:lnSpc>
+                <a:spcPct val="90000"/>
+              </a:lnSpc>
+              <a:spcBef>
+                <a:spcPts val="500"/>
+              </a:spcBef>
+              <a:buFont typeface="Arial" panose="020B0604020202020204" pitchFamily="34" charset="0"/>
+              <a:buChar char="•"/>
+              <a:defRPr sz="1800" kern="1200">
+                <a:solidFill>
+                  <a:schemeClr val="tx1"/>
+                </a:solidFill>
+                <a:latin typeface="+mn-lt"/>
+                <a:ea typeface="+mn-ea"/>
+                <a:cs typeface="+mn-cs"/>
+              </a:defRPr>
+            </a:lvl7pPr>
+            <a:lvl8pPr marL="3429000" indent="-228600" algn="l" defTabSz="914400" rtl="0" eaLnBrk="1" latinLnBrk="0" hangingPunct="1">
+              <a:lnSpc>
+                <a:spcPct val="90000"/>
+              </a:lnSpc>
+              <a:spcBef>
+                <a:spcPts val="500"/>
+              </a:spcBef>
+              <a:buFont typeface="Arial" panose="020B0604020202020204" pitchFamily="34" charset="0"/>
+              <a:buChar char="•"/>
+              <a:defRPr sz="1800" kern="1200">
+                <a:solidFill>
+                  <a:schemeClr val="tx1"/>
+                </a:solidFill>
+                <a:latin typeface="+mn-lt"/>
+                <a:ea typeface="+mn-ea"/>
+                <a:cs typeface="+mn-cs"/>
+              </a:defRPr>
+            </a:lvl8pPr>
+            <a:lvl9pPr marL="3886200" indent="-228600" algn="l" defTabSz="914400" rtl="0" eaLnBrk="1" latinLnBrk="0" hangingPunct="1">
+              <a:lnSpc>
+                <a:spcPct val="90000"/>
+              </a:lnSpc>
+              <a:spcBef>
+                <a:spcPts val="500"/>
+              </a:spcBef>
+              <a:buFont typeface="Arial" panose="020B0604020202020204" pitchFamily="34" charset="0"/>
+              <a:buChar char="•"/>
+              <a:defRPr sz="1800" kern="1200">
+                <a:solidFill>
+                  <a:schemeClr val="tx1"/>
+                </a:solidFill>
+                <a:latin typeface="+mn-lt"/>
+                <a:ea typeface="+mn-ea"/>
+                <a:cs typeface="+mn-cs"/>
+              </a:defRPr>
+            </a:lvl9pPr>
+          </a:lstStyle>
+          <a:p>
+            <a:r>
+              <a:rPr lang="en-GB" dirty="0">
+                <a:solidFill>
+                  <a:srgbClr val="FF0000"/>
+                </a:solidFill>
+                <a:latin typeface="Arial" panose="020B0604020202020204" pitchFamily="34" charset="0"/>
+                <a:cs typeface="Arial" panose="020B0604020202020204" pitchFamily="34" charset="0"/>
+              </a:rPr>
+              <a:t>1. Carbon dioxide (CO</a:t>
+            </a:r>
+            <a:r>
+              <a:rPr lang="en-GB" baseline="-25000" dirty="0">
+                <a:solidFill>
+                  <a:srgbClr val="FF0000"/>
+                </a:solidFill>
+                <a:latin typeface="Arial" panose="020B0604020202020204" pitchFamily="34" charset="0"/>
+                <a:cs typeface="Arial" panose="020B0604020202020204" pitchFamily="34" charset="0"/>
+              </a:rPr>
+              <a:t>2</a:t>
+            </a:r>
+            <a:r>
+              <a:rPr lang="en-GB" dirty="0">
+                <a:solidFill>
+                  <a:srgbClr val="FF0000"/>
+                </a:solidFill>
+                <a:latin typeface="Arial" panose="020B0604020202020204" pitchFamily="34" charset="0"/>
+                <a:cs typeface="Arial" panose="020B0604020202020204" pitchFamily="34" charset="0"/>
+              </a:rPr>
+              <a:t>)–</a:t>
+            </a:r>
+          </a:p>
+          <a:p>
+            <a:r>
+              <a:rPr lang="en-GB" i="0" u="none" strike="noStrike" dirty="0">
+                <a:effectLst/>
+                <a:latin typeface="arial" panose="020B0604020202020204" pitchFamily="34" charset="0"/>
+              </a:rPr>
+              <a:t>CO</a:t>
+            </a:r>
+            <a:r>
+              <a:rPr lang="en-GB" i="0" u="none" strike="noStrike" baseline="-25000" dirty="0">
+                <a:effectLst/>
+                <a:latin typeface="arial" panose="020B0604020202020204" pitchFamily="34" charset="0"/>
+              </a:rPr>
+              <a:t>2</a:t>
+            </a:r>
+            <a:r>
+              <a:rPr lang="en-GB" i="0" u="none" strike="noStrike" dirty="0">
+                <a:effectLst/>
+                <a:latin typeface="arial" panose="020B0604020202020204" pitchFamily="34" charset="0"/>
+              </a:rPr>
+              <a:t> causes 80% of global warming</a:t>
+            </a:r>
+            <a:r>
+              <a:rPr lang="en-GB" dirty="0">
+                <a:latin typeface="arial" panose="020B0604020202020204" pitchFamily="34" charset="0"/>
+              </a:rPr>
+              <a:t> and its release is mainly contributed by </a:t>
+            </a:r>
+            <a:r>
+              <a:rPr lang="en-GB" i="0" u="none" strike="noStrike" dirty="0">
+                <a:effectLst/>
+                <a:latin typeface="arial" panose="020B0604020202020204" pitchFamily="34" charset="0"/>
+              </a:rPr>
+              <a:t>fossil fuels burning like coal, oil and gas or </a:t>
+            </a:r>
+            <a:r>
+              <a:rPr lang="en-GB" dirty="0">
+                <a:latin typeface="arial" panose="020B0604020202020204" pitchFamily="34" charset="0"/>
+              </a:rPr>
+              <a:t>deforestation.</a:t>
+            </a:r>
+          </a:p>
+          <a:p>
+            <a:r>
+              <a:rPr lang="en-GB" dirty="0">
+                <a:solidFill>
+                  <a:srgbClr val="FF0000"/>
+                </a:solidFill>
+                <a:latin typeface="Arial" panose="020B0604020202020204" pitchFamily="34" charset="0"/>
+                <a:cs typeface="Arial" panose="020B0604020202020204" pitchFamily="34" charset="0"/>
+              </a:rPr>
+              <a:t>2. Methane (CH</a:t>
+            </a:r>
+            <a:r>
+              <a:rPr lang="en-GB" baseline="-25000" dirty="0">
+                <a:solidFill>
+                  <a:srgbClr val="FF0000"/>
+                </a:solidFill>
+                <a:latin typeface="Arial" panose="020B0604020202020204" pitchFamily="34" charset="0"/>
+                <a:cs typeface="Arial" panose="020B0604020202020204" pitchFamily="34" charset="0"/>
+              </a:rPr>
+              <a:t>4</a:t>
+            </a:r>
+            <a:r>
+              <a:rPr lang="en-GB" dirty="0">
+                <a:solidFill>
+                  <a:srgbClr val="FF0000"/>
+                </a:solidFill>
+                <a:latin typeface="Arial" panose="020B0604020202020204" pitchFamily="34" charset="0"/>
+                <a:cs typeface="Arial" panose="020B0604020202020204" pitchFamily="34" charset="0"/>
+              </a:rPr>
+              <a:t>)– </a:t>
+            </a:r>
+          </a:p>
+          <a:p>
+            <a:r>
+              <a:rPr lang="en-GB" i="0" dirty="0">
+                <a:effectLst/>
+                <a:latin typeface="Arial" panose="020B0604020202020204" pitchFamily="34" charset="0"/>
+                <a:cs typeface="Arial" panose="020B0604020202020204" pitchFamily="34" charset="0"/>
+              </a:rPr>
+              <a:t>Methane possess &gt;80 times the warming power of carbon dioxide for the first 20 years after being released</a:t>
+            </a:r>
+            <a:endParaRPr lang="en-GB" dirty="0">
+              <a:latin typeface="Arial" panose="020B0604020202020204" pitchFamily="34" charset="0"/>
+              <a:cs typeface="Arial" panose="020B0604020202020204" pitchFamily="34" charset="0"/>
+            </a:endParaRPr>
+          </a:p>
+          <a:p>
+            <a:r>
+              <a:rPr lang="en-GB" dirty="0">
+                <a:solidFill>
+                  <a:srgbClr val="FF0000"/>
+                </a:solidFill>
+                <a:latin typeface="Arial" panose="020B0604020202020204" pitchFamily="34" charset="0"/>
+                <a:cs typeface="Arial" panose="020B0604020202020204" pitchFamily="34" charset="0"/>
+              </a:rPr>
+              <a:t>3. Nitrous oxide (NO</a:t>
+            </a:r>
+            <a:r>
+              <a:rPr lang="en-GB" baseline="-25000" dirty="0">
+                <a:solidFill>
+                  <a:srgbClr val="FF0000"/>
+                </a:solidFill>
+                <a:latin typeface="Arial" panose="020B0604020202020204" pitchFamily="34" charset="0"/>
+                <a:cs typeface="Arial" panose="020B0604020202020204" pitchFamily="34" charset="0"/>
+              </a:rPr>
+              <a:t>2</a:t>
+            </a:r>
+            <a:r>
+              <a:rPr lang="en-GB" dirty="0">
+                <a:solidFill>
+                  <a:srgbClr val="FF0000"/>
+                </a:solidFill>
+                <a:latin typeface="Arial" panose="020B0604020202020204" pitchFamily="34" charset="0"/>
+                <a:cs typeface="Arial" panose="020B0604020202020204" pitchFamily="34" charset="0"/>
+              </a:rPr>
+              <a:t>) –</a:t>
+            </a:r>
+          </a:p>
+          <a:p>
+            <a:r>
+              <a:rPr lang="en-GB" i="0" u="none" strike="noStrike" dirty="0">
+                <a:effectLst/>
+                <a:latin typeface="Arial" panose="020B0604020202020204" pitchFamily="34" charset="0"/>
+                <a:cs typeface="Arial" panose="020B0604020202020204" pitchFamily="34" charset="0"/>
+              </a:rPr>
+              <a:t>Increased N- based fertilizer use (&gt;50 years) has been responsible for dramatic increase in its emission. </a:t>
+            </a:r>
+            <a:endParaRPr lang="en-GB" dirty="0">
+              <a:latin typeface="Arial" panose="020B0604020202020204" pitchFamily="34" charset="0"/>
+              <a:cs typeface="Arial" panose="020B0604020202020204" pitchFamily="34" charset="0"/>
+            </a:endParaRPr>
+          </a:p>
+          <a:p>
+            <a:r>
+              <a:rPr lang="en-GB" dirty="0">
+                <a:solidFill>
+                  <a:srgbClr val="FF0000"/>
+                </a:solidFill>
+                <a:latin typeface="Arial" panose="020B0604020202020204" pitchFamily="34" charset="0"/>
+                <a:cs typeface="Arial" panose="020B0604020202020204" pitchFamily="34" charset="0"/>
+              </a:rPr>
+              <a:t>4. Hydrofluorocarbons (HFC) –</a:t>
+            </a:r>
+          </a:p>
+          <a:p>
+            <a:r>
+              <a:rPr lang="en-GB" i="0" u="none" strike="noStrike" dirty="0">
+                <a:solidFill>
+                  <a:srgbClr val="202124"/>
+                </a:solidFill>
+                <a:effectLst/>
+                <a:latin typeface="arial" panose="020B0604020202020204" pitchFamily="34" charset="0"/>
+              </a:rPr>
+              <a:t>HFCs are highly effective at trapping solar radiation (infrared radiation) and redirecting that radiant energy toward Earth's surface. </a:t>
+            </a:r>
+          </a:p>
+          <a:p>
+            <a:r>
+              <a:rPr lang="en-GB" dirty="0">
+                <a:solidFill>
+                  <a:srgbClr val="202124"/>
+                </a:solidFill>
+                <a:latin typeface="arial" panose="020B0604020202020204" pitchFamily="34" charset="0"/>
+              </a:rPr>
+              <a:t>Major source of HFCs are refrigeration and air conditioning</a:t>
+            </a:r>
+            <a:endParaRPr lang="en-GB" i="0" u="none" strike="noStrike" dirty="0">
+              <a:solidFill>
+                <a:srgbClr val="202124"/>
+              </a:solidFill>
+              <a:effectLst/>
+              <a:latin typeface="arial" panose="020B0604020202020204" pitchFamily="34" charset="0"/>
+            </a:endParaRPr>
           </a:p>
         </p:txBody>
       </p:sp>
+      <p:pic>
+        <p:nvPicPr>
+          <p:cNvPr id="9" name="Picture 8" descr="Chart&#10;&#10;Description automatically generated">
+            <a:extLst>
+              <a:ext uri="{FF2B5EF4-FFF2-40B4-BE49-F238E27FC236}">
+                <a16:creationId xmlns:a16="http://schemas.microsoft.com/office/drawing/2014/main" id="{F512880D-4D02-8ED1-3899-21F58B1BBCF5}"/>
+              </a:ext>
+            </a:extLst>
+          </p:cNvPr>
+          <p:cNvPicPr>
+            <a:picLocks noChangeAspect="1"/>
+          </p:cNvPicPr>
+          <p:nvPr/>
+        </p:nvPicPr>
+        <p:blipFill>
+          <a:blip r:embed="rId2">
+            <a:extLst>
+              <a:ext uri="{28A0092B-C50C-407E-A947-70E740481C1C}">
+                <a14:useLocalDpi xmlns:a14="http://schemas.microsoft.com/office/drawing/2010/main" val="0"/>
+              </a:ext>
+            </a:extLst>
+          </a:blip>
+          <a:stretch>
+            <a:fillRect/>
+          </a:stretch>
+        </p:blipFill>
+        <p:spPr>
+          <a:xfrm>
+            <a:off x="655401" y="2011382"/>
+            <a:ext cx="4838700" cy="4615948"/>
+          </a:xfrm>
+          <a:prstGeom prst="rect">
+            <a:avLst/>
+          </a:prstGeom>
+        </p:spPr>
+      </p:pic>
       <p:sp>
         <p:nvSpPr>
-          <p:cNvPr id="4" name="Footer Placeholder 3">
-            <a:extLst>
-              <a:ext uri="{FF2B5EF4-FFF2-40B4-BE49-F238E27FC236}">
-                <a16:creationId xmlns:a16="http://schemas.microsoft.com/office/drawing/2014/main" id="{529E91F3-E1A0-DB4A-8CD8-D9D1AB0FFB40}"/>
-              </a:ext>
-            </a:extLst>
-          </p:cNvPr>
-          <p:cNvSpPr>
-            <a:spLocks noGrp="1"/>
+          <p:cNvPr id="10" name="Title 1">
+            <a:extLst>
+              <a:ext uri="{FF2B5EF4-FFF2-40B4-BE49-F238E27FC236}">
+                <a16:creationId xmlns:a16="http://schemas.microsoft.com/office/drawing/2014/main" id="{C3483C1E-3C51-8A7D-6AE9-256AA0AC2BC7}"/>
+              </a:ext>
+            </a:extLst>
+          </p:cNvPr>
+          <p:cNvSpPr txBox="1">
+            <a:spLocks/>
           </p:cNvSpPr>
-          <p:nvPr>
-            <p:ph type="ftr" sz="quarter" idx="22"/>
-          </p:nvPr>
+          <p:nvPr/>
         </p:nvSpPr>
         <p:spPr>
           <a:xfrm>
-            <a:off x="1494790" y="6332220"/>
-            <a:ext cx="1497330" cy="247651"/>
+            <a:off x="1401723" y="433491"/>
+            <a:ext cx="8977999" cy="610863"/>
           </a:xfrm>
+          <a:prstGeom prst="rect">
+            <a:avLst/>
+          </a:prstGeom>
         </p:spPr>
         <p:txBody>
-          <a:bodyPr/>
-          <a:lstStyle/>
+          <a:bodyPr vert="horz" lIns="0" tIns="0" rIns="0" bIns="0" rtlCol="0" anchor="b" anchorCtr="0">
+            <a:normAutofit/>
+          </a:bodyPr>
+          <a:lstStyle>
+            <a:lvl1pPr algn="l" defTabSz="914400" rtl="0" eaLnBrk="1" latinLnBrk="0" hangingPunct="1">
+              <a:lnSpc>
+                <a:spcPct val="90000"/>
+              </a:lnSpc>
+              <a:spcBef>
+                <a:spcPct val="0"/>
+              </a:spcBef>
+              <a:buNone/>
+              <a:defRPr sz="4400" b="1" i="0" kern="1200" spc="100" baseline="0">
+                <a:solidFill>
+                  <a:schemeClr val="bg1"/>
+                </a:solidFill>
+                <a:latin typeface="+mj-lt"/>
+                <a:ea typeface="+mj-ea"/>
+                <a:cs typeface="+mj-cs"/>
+              </a:defRPr>
+            </a:lvl1pPr>
+            <a:lvl2pPr eaLnBrk="1" hangingPunct="1">
+              <a:defRPr>
+                <a:solidFill>
+                  <a:schemeClr val="tx2"/>
+                </a:solidFill>
+              </a:defRPr>
+            </a:lvl2pPr>
+            <a:lvl3pPr eaLnBrk="1" hangingPunct="1">
+              <a:defRPr>
+                <a:solidFill>
+                  <a:schemeClr val="tx2"/>
+                </a:solidFill>
+              </a:defRPr>
+            </a:lvl3pPr>
+            <a:lvl4pPr eaLnBrk="1" hangingPunct="1">
+              <a:defRPr>
+                <a:solidFill>
+                  <a:schemeClr val="tx2"/>
+                </a:solidFill>
+              </a:defRPr>
+            </a:lvl4pPr>
+            <a:lvl5pPr eaLnBrk="1" hangingPunct="1">
+              <a:defRPr>
+                <a:solidFill>
+                  <a:schemeClr val="tx2"/>
+                </a:solidFill>
+              </a:defRPr>
+            </a:lvl5pPr>
+            <a:lvl6pPr eaLnBrk="1" hangingPunct="1">
+              <a:defRPr>
+                <a:solidFill>
+                  <a:schemeClr val="tx2"/>
+                </a:solidFill>
+              </a:defRPr>
+            </a:lvl6pPr>
+            <a:lvl7pPr eaLnBrk="1" hangingPunct="1">
+              <a:defRPr>
+                <a:solidFill>
+                  <a:schemeClr val="tx2"/>
+                </a:solidFill>
+              </a:defRPr>
+            </a:lvl7pPr>
+            <a:lvl8pPr eaLnBrk="1" hangingPunct="1">
+              <a:defRPr>
+                <a:solidFill>
+                  <a:schemeClr val="tx2"/>
+                </a:solidFill>
+              </a:defRPr>
+            </a:lvl8pPr>
+            <a:lvl9pPr eaLnBrk="1" hangingPunct="1">
+              <a:defRPr>
+                <a:solidFill>
+                  <a:schemeClr val="tx2"/>
+                </a:solidFill>
+              </a:defRPr>
+            </a:lvl9pPr>
+          </a:lstStyle>
           <a:p>
             <a:r>
               <a:rPr lang="en-US" dirty="0"/>
-              <a:t>Project One</a:t>
-            </a:r>
-          </a:p>
-        </p:txBody>
-      </p:sp>
-      <p:sp>
-        <p:nvSpPr>
-          <p:cNvPr id="3" name="Date Placeholder 2">
-            <a:extLst>
-              <a:ext uri="{FF2B5EF4-FFF2-40B4-BE49-F238E27FC236}">
-                <a16:creationId xmlns:a16="http://schemas.microsoft.com/office/drawing/2014/main" id="{4D5B7634-ADBA-124F-B8CA-431F07F18D44}"/>
-              </a:ext>
-            </a:extLst>
-          </p:cNvPr>
-          <p:cNvSpPr>
-            <a:spLocks noGrp="1"/>
-          </p:cNvSpPr>
-          <p:nvPr>
-            <p:ph type="dt" sz="half" idx="21"/>
-          </p:nvPr>
-        </p:nvSpPr>
-        <p:spPr>
-          <a:xfrm>
-            <a:off x="2992120" y="6332220"/>
-            <a:ext cx="1313180" cy="247651"/>
-          </a:xfrm>
-        </p:spPr>
-        <p:txBody>
-          <a:bodyPr/>
-          <a:lstStyle/>
-          <a:p>
-            <a:fld id="{6FCA8E82-58CD-E045-8B98-B7A85B79B752}" type="datetime4">
-              <a:rPr lang="en-US" smtClean="0"/>
-              <a:pPr/>
-              <a:t>October 17, 2022</a:t>
-            </a:fld>
-            <a:endParaRPr lang="en-US" dirty="0"/>
+              <a:t>Composition of Greenhouse Gases</a:t>
+            </a:r>
           </a:p>
         </p:txBody>
       </p:sp>
     </p:spTree>
     <p:extLst>
       <p:ext uri="{BB962C8B-B14F-4D97-AF65-F5344CB8AC3E}">
-        <p14:creationId xmlns:p14="http://schemas.microsoft.com/office/powerpoint/2010/main" val="643842168"/>
+        <p14:creationId xmlns:p14="http://schemas.microsoft.com/office/powerpoint/2010/main" val="3514829862"/>
       </p:ext>
     </p:extLst>
   </p:cSld>
@@ -15030,6 +15026,1853 @@
       </p:grpSpPr>
       <p:sp>
         <p:nvSpPr>
+          <p:cNvPr id="28" name="Title 1">
+            <a:extLst>
+              <a:ext uri="{FF2B5EF4-FFF2-40B4-BE49-F238E27FC236}">
+                <a16:creationId xmlns:a16="http://schemas.microsoft.com/office/drawing/2014/main" id="{09AB8840-4F13-2301-51CF-2687DD69874E}"/>
+              </a:ext>
+            </a:extLst>
+          </p:cNvPr>
+          <p:cNvSpPr>
+            <a:spLocks noGrp="1"/>
+          </p:cNvSpPr>
+          <p:nvPr>
+            <p:ph type="title"/>
+          </p:nvPr>
+        </p:nvSpPr>
+        <p:spPr>
+          <a:xfrm>
+            <a:off x="299005" y="230670"/>
+            <a:ext cx="11671322" cy="610863"/>
+          </a:xfrm>
+        </p:spPr>
+        <p:txBody>
+          <a:bodyPr vert="horz" lIns="0" tIns="0" rIns="0" bIns="0" rtlCol="0" anchor="b" anchorCtr="0">
+            <a:normAutofit/>
+          </a:bodyPr>
+          <a:lstStyle/>
+          <a:p>
+            <a:pPr algn="ctr"/>
+            <a:r>
+              <a:rPr lang="en-US" b="1" i="0" kern="1200" spc="100" baseline="0" dirty="0">
+                <a:latin typeface="+mj-lt"/>
+                <a:ea typeface="+mj-ea"/>
+                <a:cs typeface="+mj-cs"/>
+              </a:rPr>
+              <a:t>Top Emitters of -</a:t>
+            </a:r>
+          </a:p>
+        </p:txBody>
+      </p:sp>
+      <p:pic>
+        <p:nvPicPr>
+          <p:cNvPr id="4" name="Picture 3" descr="Chart, pie chart&#10;&#10;Description automatically generated">
+            <a:extLst>
+              <a:ext uri="{FF2B5EF4-FFF2-40B4-BE49-F238E27FC236}">
+                <a16:creationId xmlns:a16="http://schemas.microsoft.com/office/drawing/2014/main" id="{04E16F77-081E-8D4D-9BF0-1099A22448AD}"/>
+              </a:ext>
+            </a:extLst>
+          </p:cNvPr>
+          <p:cNvPicPr>
+            <a:picLocks noChangeAspect="1"/>
+          </p:cNvPicPr>
+          <p:nvPr/>
+        </p:nvPicPr>
+        <p:blipFill>
+          <a:blip r:embed="rId2">
+            <a:extLst>
+              <a:ext uri="{28A0092B-C50C-407E-A947-70E740481C1C}">
+                <a14:useLocalDpi xmlns:a14="http://schemas.microsoft.com/office/drawing/2010/main" val="0"/>
+              </a:ext>
+            </a:extLst>
+          </a:blip>
+          <a:stretch>
+            <a:fillRect/>
+          </a:stretch>
+        </p:blipFill>
+        <p:spPr>
+          <a:xfrm>
+            <a:off x="84812" y="2208810"/>
+            <a:ext cx="6334766" cy="4349468"/>
+          </a:xfrm>
+          <a:prstGeom prst="rect">
+            <a:avLst/>
+          </a:prstGeom>
+        </p:spPr>
+      </p:pic>
+      <p:pic>
+        <p:nvPicPr>
+          <p:cNvPr id="9" name="Picture 8" descr="Chart, pie chart&#10;&#10;Description automatically generated">
+            <a:extLst>
+              <a:ext uri="{FF2B5EF4-FFF2-40B4-BE49-F238E27FC236}">
+                <a16:creationId xmlns:a16="http://schemas.microsoft.com/office/drawing/2014/main" id="{8EFDA691-FEB6-684C-7997-2B275022D923}"/>
+              </a:ext>
+            </a:extLst>
+          </p:cNvPr>
+          <p:cNvPicPr>
+            <a:picLocks noChangeAspect="1"/>
+          </p:cNvPicPr>
+          <p:nvPr/>
+        </p:nvPicPr>
+        <p:blipFill>
+          <a:blip r:embed="rId3">
+            <a:extLst>
+              <a:ext uri="{28A0092B-C50C-407E-A947-70E740481C1C}">
+                <a14:useLocalDpi xmlns:a14="http://schemas.microsoft.com/office/drawing/2010/main" val="0"/>
+              </a:ext>
+            </a:extLst>
+          </a:blip>
+          <a:stretch>
+            <a:fillRect/>
+          </a:stretch>
+        </p:blipFill>
+        <p:spPr>
+          <a:xfrm>
+            <a:off x="6419578" y="2129131"/>
+            <a:ext cx="5391570" cy="4498199"/>
+          </a:xfrm>
+          <a:prstGeom prst="rect">
+            <a:avLst/>
+          </a:prstGeom>
+        </p:spPr>
+      </p:pic>
+      <p:sp>
+        <p:nvSpPr>
+          <p:cNvPr id="12" name="Text Placeholder 2">
+            <a:extLst>
+              <a:ext uri="{FF2B5EF4-FFF2-40B4-BE49-F238E27FC236}">
+                <a16:creationId xmlns:a16="http://schemas.microsoft.com/office/drawing/2014/main" id="{BBE6ED2C-FF4E-C833-F2E8-A13571BCE8B1}"/>
+              </a:ext>
+            </a:extLst>
+          </p:cNvPr>
+          <p:cNvSpPr txBox="1">
+            <a:spLocks/>
+          </p:cNvSpPr>
+          <p:nvPr/>
+        </p:nvSpPr>
+        <p:spPr>
+          <a:xfrm>
+            <a:off x="3207357" y="1744164"/>
+            <a:ext cx="807423" cy="315915"/>
+          </a:xfrm>
+          <a:prstGeom prst="rect">
+            <a:avLst/>
+          </a:prstGeom>
+        </p:spPr>
+        <p:txBody>
+          <a:bodyPr vert="horz" lIns="91440" tIns="45720" rIns="91440" bIns="45720" rtlCol="0">
+            <a:noAutofit/>
+          </a:bodyPr>
+          <a:lstStyle>
+            <a:lvl1pPr marL="228600" indent="-228600" algn="l" defTabSz="914400" rtl="0" eaLnBrk="1" latinLnBrk="0" hangingPunct="1">
+              <a:lnSpc>
+                <a:spcPct val="90000"/>
+              </a:lnSpc>
+              <a:spcBef>
+                <a:spcPts val="1000"/>
+              </a:spcBef>
+              <a:buFont typeface="Arial" panose="020B0604020202020204" pitchFamily="34" charset="0"/>
+              <a:buNone/>
+              <a:defRPr sz="1800" b="0" i="0" kern="1200" spc="0" baseline="0">
+                <a:solidFill>
+                  <a:schemeClr val="tx2"/>
+                </a:solidFill>
+                <a:latin typeface="+mj-lt"/>
+                <a:ea typeface="+mn-ea"/>
+                <a:cs typeface="+mn-cs"/>
+              </a:defRPr>
+            </a:lvl1pPr>
+            <a:lvl2pPr marL="685800" indent="-228600" algn="l" defTabSz="914400" rtl="0" eaLnBrk="1" latinLnBrk="0" hangingPunct="1">
+              <a:lnSpc>
+                <a:spcPct val="90000"/>
+              </a:lnSpc>
+              <a:spcBef>
+                <a:spcPts val="500"/>
+              </a:spcBef>
+              <a:buFont typeface="Arial" panose="020B0604020202020204" pitchFamily="34" charset="0"/>
+              <a:buNone/>
+              <a:defRPr sz="2400" b="0" i="0" kern="1200">
+                <a:solidFill>
+                  <a:schemeClr val="bg1"/>
+                </a:solidFill>
+                <a:latin typeface="+mn-lt"/>
+                <a:ea typeface="+mn-ea"/>
+                <a:cs typeface="+mn-cs"/>
+              </a:defRPr>
+            </a:lvl2pPr>
+            <a:lvl3pPr marL="1143000" indent="-228600" algn="l" defTabSz="914400" rtl="0" eaLnBrk="1" latinLnBrk="0" hangingPunct="1">
+              <a:lnSpc>
+                <a:spcPct val="90000"/>
+              </a:lnSpc>
+              <a:spcBef>
+                <a:spcPts val="500"/>
+              </a:spcBef>
+              <a:buFont typeface="Arial" panose="020B0604020202020204" pitchFamily="34" charset="0"/>
+              <a:buNone/>
+              <a:defRPr sz="2000" b="0" i="0" kern="1200">
+                <a:solidFill>
+                  <a:schemeClr val="bg1"/>
+                </a:solidFill>
+                <a:latin typeface="+mn-lt"/>
+                <a:ea typeface="+mn-ea"/>
+                <a:cs typeface="+mn-cs"/>
+              </a:defRPr>
+            </a:lvl3pPr>
+            <a:lvl4pPr marL="1600200" indent="-228600" algn="l" defTabSz="914400" rtl="0" eaLnBrk="1" latinLnBrk="0" hangingPunct="1">
+              <a:lnSpc>
+                <a:spcPct val="90000"/>
+              </a:lnSpc>
+              <a:spcBef>
+                <a:spcPts val="500"/>
+              </a:spcBef>
+              <a:buFont typeface="Arial" panose="020B0604020202020204" pitchFamily="34" charset="0"/>
+              <a:buNone/>
+              <a:defRPr sz="1800" b="0" i="0" kern="1200">
+                <a:solidFill>
+                  <a:schemeClr val="bg1"/>
+                </a:solidFill>
+                <a:latin typeface="+mn-lt"/>
+                <a:ea typeface="+mn-ea"/>
+                <a:cs typeface="+mn-cs"/>
+              </a:defRPr>
+            </a:lvl4pPr>
+            <a:lvl5pPr marL="2057400" indent="-228600" algn="l" defTabSz="914400" rtl="0" eaLnBrk="1" latinLnBrk="0" hangingPunct="1">
+              <a:lnSpc>
+                <a:spcPct val="90000"/>
+              </a:lnSpc>
+              <a:spcBef>
+                <a:spcPts val="500"/>
+              </a:spcBef>
+              <a:buFont typeface="Arial" panose="020B0604020202020204" pitchFamily="34" charset="0"/>
+              <a:buNone/>
+              <a:defRPr sz="1800" b="0" i="0" kern="1200">
+                <a:solidFill>
+                  <a:schemeClr val="bg1"/>
+                </a:solidFill>
+                <a:latin typeface="+mn-lt"/>
+                <a:ea typeface="+mn-ea"/>
+                <a:cs typeface="+mn-cs"/>
+              </a:defRPr>
+            </a:lvl5pPr>
+            <a:lvl6pPr marL="2514600" indent="-228600" algn="l" defTabSz="914400" rtl="0" eaLnBrk="1" latinLnBrk="0" hangingPunct="1">
+              <a:lnSpc>
+                <a:spcPct val="90000"/>
+              </a:lnSpc>
+              <a:spcBef>
+                <a:spcPts val="500"/>
+              </a:spcBef>
+              <a:buFont typeface="Arial" panose="020B0604020202020204" pitchFamily="34" charset="0"/>
+              <a:buChar char="•"/>
+              <a:defRPr sz="1800" kern="1200">
+                <a:solidFill>
+                  <a:schemeClr val="tx1"/>
+                </a:solidFill>
+                <a:latin typeface="+mn-lt"/>
+                <a:ea typeface="+mn-ea"/>
+                <a:cs typeface="+mn-cs"/>
+              </a:defRPr>
+            </a:lvl6pPr>
+            <a:lvl7pPr marL="2971800" indent="-228600" algn="l" defTabSz="914400" rtl="0" eaLnBrk="1" latinLnBrk="0" hangingPunct="1">
+              <a:lnSpc>
+                <a:spcPct val="90000"/>
+              </a:lnSpc>
+              <a:spcBef>
+                <a:spcPts val="500"/>
+              </a:spcBef>
+              <a:buFont typeface="Arial" panose="020B0604020202020204" pitchFamily="34" charset="0"/>
+              <a:buChar char="•"/>
+              <a:defRPr sz="1800" kern="1200">
+                <a:solidFill>
+                  <a:schemeClr val="tx1"/>
+                </a:solidFill>
+                <a:latin typeface="+mn-lt"/>
+                <a:ea typeface="+mn-ea"/>
+                <a:cs typeface="+mn-cs"/>
+              </a:defRPr>
+            </a:lvl7pPr>
+            <a:lvl8pPr marL="3429000" indent="-228600" algn="l" defTabSz="914400" rtl="0" eaLnBrk="1" latinLnBrk="0" hangingPunct="1">
+              <a:lnSpc>
+                <a:spcPct val="90000"/>
+              </a:lnSpc>
+              <a:spcBef>
+                <a:spcPts val="500"/>
+              </a:spcBef>
+              <a:buFont typeface="Arial" panose="020B0604020202020204" pitchFamily="34" charset="0"/>
+              <a:buChar char="•"/>
+              <a:defRPr sz="1800" kern="1200">
+                <a:solidFill>
+                  <a:schemeClr val="tx1"/>
+                </a:solidFill>
+                <a:latin typeface="+mn-lt"/>
+                <a:ea typeface="+mn-ea"/>
+                <a:cs typeface="+mn-cs"/>
+              </a:defRPr>
+            </a:lvl8pPr>
+            <a:lvl9pPr marL="3886200" indent="-228600" algn="l" defTabSz="914400" rtl="0" eaLnBrk="1" latinLnBrk="0" hangingPunct="1">
+              <a:lnSpc>
+                <a:spcPct val="90000"/>
+              </a:lnSpc>
+              <a:spcBef>
+                <a:spcPts val="500"/>
+              </a:spcBef>
+              <a:buFont typeface="Arial" panose="020B0604020202020204" pitchFamily="34" charset="0"/>
+              <a:buChar char="•"/>
+              <a:defRPr sz="1800" kern="1200">
+                <a:solidFill>
+                  <a:schemeClr val="tx1"/>
+                </a:solidFill>
+                <a:latin typeface="+mn-lt"/>
+                <a:ea typeface="+mn-ea"/>
+                <a:cs typeface="+mn-cs"/>
+              </a:defRPr>
+            </a:lvl9pPr>
+          </a:lstStyle>
+          <a:p>
+            <a:r>
+              <a:rPr lang="en-US" sz="2400">
+                <a:solidFill>
+                  <a:schemeClr val="bg1"/>
+                </a:solidFill>
+              </a:rPr>
+              <a:t>CO</a:t>
+            </a:r>
+            <a:r>
+              <a:rPr lang="en-US" sz="2400" baseline="-25000">
+                <a:solidFill>
+                  <a:schemeClr val="bg1"/>
+                </a:solidFill>
+              </a:rPr>
+              <a:t>2</a:t>
+            </a:r>
+            <a:endParaRPr lang="en-US" sz="2400" baseline="-25000" dirty="0">
+              <a:solidFill>
+                <a:schemeClr val="bg1"/>
+              </a:solidFill>
+            </a:endParaRPr>
+          </a:p>
+        </p:txBody>
+      </p:sp>
+      <p:sp>
+        <p:nvSpPr>
+          <p:cNvPr id="13" name="Text Placeholder 2">
+            <a:extLst>
+              <a:ext uri="{FF2B5EF4-FFF2-40B4-BE49-F238E27FC236}">
+                <a16:creationId xmlns:a16="http://schemas.microsoft.com/office/drawing/2014/main" id="{0D7C2448-FE8E-2A1A-B8F3-628258B03CE9}"/>
+              </a:ext>
+            </a:extLst>
+          </p:cNvPr>
+          <p:cNvSpPr txBox="1">
+            <a:spLocks/>
+          </p:cNvSpPr>
+          <p:nvPr/>
+        </p:nvSpPr>
+        <p:spPr>
+          <a:xfrm>
+            <a:off x="8070342" y="1737192"/>
+            <a:ext cx="1453667" cy="315915"/>
+          </a:xfrm>
+          <a:prstGeom prst="rect">
+            <a:avLst/>
+          </a:prstGeom>
+        </p:spPr>
+        <p:txBody>
+          <a:bodyPr vert="horz" lIns="91440" tIns="45720" rIns="91440" bIns="45720" rtlCol="0">
+            <a:noAutofit/>
+          </a:bodyPr>
+          <a:lstStyle>
+            <a:lvl1pPr marL="228600" indent="-228600" algn="l" defTabSz="914400" rtl="0" eaLnBrk="1" latinLnBrk="0" hangingPunct="1">
+              <a:lnSpc>
+                <a:spcPct val="90000"/>
+              </a:lnSpc>
+              <a:spcBef>
+                <a:spcPts val="1000"/>
+              </a:spcBef>
+              <a:buFont typeface="Arial" panose="020B0604020202020204" pitchFamily="34" charset="0"/>
+              <a:buNone/>
+              <a:defRPr sz="1800" b="0" i="0" kern="1200" spc="0" baseline="0">
+                <a:solidFill>
+                  <a:schemeClr val="tx2"/>
+                </a:solidFill>
+                <a:latin typeface="+mj-lt"/>
+                <a:ea typeface="+mn-ea"/>
+                <a:cs typeface="+mn-cs"/>
+              </a:defRPr>
+            </a:lvl1pPr>
+            <a:lvl2pPr marL="685800" indent="-228600" algn="l" defTabSz="914400" rtl="0" eaLnBrk="1" latinLnBrk="0" hangingPunct="1">
+              <a:lnSpc>
+                <a:spcPct val="90000"/>
+              </a:lnSpc>
+              <a:spcBef>
+                <a:spcPts val="500"/>
+              </a:spcBef>
+              <a:buFont typeface="Arial" panose="020B0604020202020204" pitchFamily="34" charset="0"/>
+              <a:buNone/>
+              <a:defRPr sz="2400" b="0" i="0" kern="1200">
+                <a:solidFill>
+                  <a:schemeClr val="bg1"/>
+                </a:solidFill>
+                <a:latin typeface="+mn-lt"/>
+                <a:ea typeface="+mn-ea"/>
+                <a:cs typeface="+mn-cs"/>
+              </a:defRPr>
+            </a:lvl2pPr>
+            <a:lvl3pPr marL="1143000" indent="-228600" algn="l" defTabSz="914400" rtl="0" eaLnBrk="1" latinLnBrk="0" hangingPunct="1">
+              <a:lnSpc>
+                <a:spcPct val="90000"/>
+              </a:lnSpc>
+              <a:spcBef>
+                <a:spcPts val="500"/>
+              </a:spcBef>
+              <a:buFont typeface="Arial" panose="020B0604020202020204" pitchFamily="34" charset="0"/>
+              <a:buNone/>
+              <a:defRPr sz="2000" b="0" i="0" kern="1200">
+                <a:solidFill>
+                  <a:schemeClr val="bg1"/>
+                </a:solidFill>
+                <a:latin typeface="+mn-lt"/>
+                <a:ea typeface="+mn-ea"/>
+                <a:cs typeface="+mn-cs"/>
+              </a:defRPr>
+            </a:lvl3pPr>
+            <a:lvl4pPr marL="1600200" indent="-228600" algn="l" defTabSz="914400" rtl="0" eaLnBrk="1" latinLnBrk="0" hangingPunct="1">
+              <a:lnSpc>
+                <a:spcPct val="90000"/>
+              </a:lnSpc>
+              <a:spcBef>
+                <a:spcPts val="500"/>
+              </a:spcBef>
+              <a:buFont typeface="Arial" panose="020B0604020202020204" pitchFamily="34" charset="0"/>
+              <a:buNone/>
+              <a:defRPr sz="1800" b="0" i="0" kern="1200">
+                <a:solidFill>
+                  <a:schemeClr val="bg1"/>
+                </a:solidFill>
+                <a:latin typeface="+mn-lt"/>
+                <a:ea typeface="+mn-ea"/>
+                <a:cs typeface="+mn-cs"/>
+              </a:defRPr>
+            </a:lvl4pPr>
+            <a:lvl5pPr marL="2057400" indent="-228600" algn="l" defTabSz="914400" rtl="0" eaLnBrk="1" latinLnBrk="0" hangingPunct="1">
+              <a:lnSpc>
+                <a:spcPct val="90000"/>
+              </a:lnSpc>
+              <a:spcBef>
+                <a:spcPts val="500"/>
+              </a:spcBef>
+              <a:buFont typeface="Arial" panose="020B0604020202020204" pitchFamily="34" charset="0"/>
+              <a:buNone/>
+              <a:defRPr sz="1800" b="0" i="0" kern="1200">
+                <a:solidFill>
+                  <a:schemeClr val="bg1"/>
+                </a:solidFill>
+                <a:latin typeface="+mn-lt"/>
+                <a:ea typeface="+mn-ea"/>
+                <a:cs typeface="+mn-cs"/>
+              </a:defRPr>
+            </a:lvl5pPr>
+            <a:lvl6pPr marL="2514600" indent="-228600" algn="l" defTabSz="914400" rtl="0" eaLnBrk="1" latinLnBrk="0" hangingPunct="1">
+              <a:lnSpc>
+                <a:spcPct val="90000"/>
+              </a:lnSpc>
+              <a:spcBef>
+                <a:spcPts val="500"/>
+              </a:spcBef>
+              <a:buFont typeface="Arial" panose="020B0604020202020204" pitchFamily="34" charset="0"/>
+              <a:buChar char="•"/>
+              <a:defRPr sz="1800" kern="1200">
+                <a:solidFill>
+                  <a:schemeClr val="tx1"/>
+                </a:solidFill>
+                <a:latin typeface="+mn-lt"/>
+                <a:ea typeface="+mn-ea"/>
+                <a:cs typeface="+mn-cs"/>
+              </a:defRPr>
+            </a:lvl6pPr>
+            <a:lvl7pPr marL="2971800" indent="-228600" algn="l" defTabSz="914400" rtl="0" eaLnBrk="1" latinLnBrk="0" hangingPunct="1">
+              <a:lnSpc>
+                <a:spcPct val="90000"/>
+              </a:lnSpc>
+              <a:spcBef>
+                <a:spcPts val="500"/>
+              </a:spcBef>
+              <a:buFont typeface="Arial" panose="020B0604020202020204" pitchFamily="34" charset="0"/>
+              <a:buChar char="•"/>
+              <a:defRPr sz="1800" kern="1200">
+                <a:solidFill>
+                  <a:schemeClr val="tx1"/>
+                </a:solidFill>
+                <a:latin typeface="+mn-lt"/>
+                <a:ea typeface="+mn-ea"/>
+                <a:cs typeface="+mn-cs"/>
+              </a:defRPr>
+            </a:lvl7pPr>
+            <a:lvl8pPr marL="3429000" indent="-228600" algn="l" defTabSz="914400" rtl="0" eaLnBrk="1" latinLnBrk="0" hangingPunct="1">
+              <a:lnSpc>
+                <a:spcPct val="90000"/>
+              </a:lnSpc>
+              <a:spcBef>
+                <a:spcPts val="500"/>
+              </a:spcBef>
+              <a:buFont typeface="Arial" panose="020B0604020202020204" pitchFamily="34" charset="0"/>
+              <a:buChar char="•"/>
+              <a:defRPr sz="1800" kern="1200">
+                <a:solidFill>
+                  <a:schemeClr val="tx1"/>
+                </a:solidFill>
+                <a:latin typeface="+mn-lt"/>
+                <a:ea typeface="+mn-ea"/>
+                <a:cs typeface="+mn-cs"/>
+              </a:defRPr>
+            </a:lvl8pPr>
+            <a:lvl9pPr marL="3886200" indent="-228600" algn="l" defTabSz="914400" rtl="0" eaLnBrk="1" latinLnBrk="0" hangingPunct="1">
+              <a:lnSpc>
+                <a:spcPct val="90000"/>
+              </a:lnSpc>
+              <a:spcBef>
+                <a:spcPts val="500"/>
+              </a:spcBef>
+              <a:buFont typeface="Arial" panose="020B0604020202020204" pitchFamily="34" charset="0"/>
+              <a:buChar char="•"/>
+              <a:defRPr sz="1800" kern="1200">
+                <a:solidFill>
+                  <a:schemeClr val="tx1"/>
+                </a:solidFill>
+                <a:latin typeface="+mn-lt"/>
+                <a:ea typeface="+mn-ea"/>
+                <a:cs typeface="+mn-cs"/>
+              </a:defRPr>
+            </a:lvl9pPr>
+          </a:lstStyle>
+          <a:p>
+            <a:r>
+              <a:rPr lang="en-US" sz="2400" dirty="0">
+                <a:solidFill>
+                  <a:schemeClr val="bg1"/>
+                </a:solidFill>
+              </a:rPr>
+              <a:t>Methane</a:t>
+            </a:r>
+            <a:endParaRPr lang="en-US" sz="2400" baseline="-25000" dirty="0">
+              <a:solidFill>
+                <a:schemeClr val="bg1"/>
+              </a:solidFill>
+            </a:endParaRPr>
+          </a:p>
+        </p:txBody>
+      </p:sp>
+    </p:spTree>
+    <p:extLst>
+      <p:ext uri="{BB962C8B-B14F-4D97-AF65-F5344CB8AC3E}">
+        <p14:creationId xmlns:p14="http://schemas.microsoft.com/office/powerpoint/2010/main" val="195988901"/>
+      </p:ext>
+    </p:extLst>
+  </p:cSld>
+  <p:clrMapOvr>
+    <a:masterClrMapping/>
+  </p:clrMapOvr>
+</p:sld>
+</file>
+
+<file path=ppt/slides/slide15.xml><?xml version="1.0" encoding="utf-8"?>
+<p:sld xmlns:a="http://schemas.openxmlformats.org/drawingml/2006/main" xmlns:r="http://schemas.openxmlformats.org/officeDocument/2006/relationships" xmlns:p="http://schemas.openxmlformats.org/presentationml/2006/main">
+  <p:cSld>
+    <p:spTree>
+      <p:nvGrpSpPr>
+        <p:cNvPr id="1" name=""/>
+        <p:cNvGrpSpPr/>
+        <p:nvPr/>
+      </p:nvGrpSpPr>
+      <p:grpSpPr>
+        <a:xfrm>
+          <a:off x="0" y="0"/>
+          <a:ext cx="0" cy="0"/>
+          <a:chOff x="0" y="0"/>
+          <a:chExt cx="0" cy="0"/>
+        </a:xfrm>
+      </p:grpSpPr>
+      <p:sp>
+        <p:nvSpPr>
+          <p:cNvPr id="28" name="Title 1">
+            <a:extLst>
+              <a:ext uri="{FF2B5EF4-FFF2-40B4-BE49-F238E27FC236}">
+                <a16:creationId xmlns:a16="http://schemas.microsoft.com/office/drawing/2014/main" id="{09AB8840-4F13-2301-51CF-2687DD69874E}"/>
+              </a:ext>
+            </a:extLst>
+          </p:cNvPr>
+          <p:cNvSpPr>
+            <a:spLocks noGrp="1"/>
+          </p:cNvSpPr>
+          <p:nvPr>
+            <p:ph type="title"/>
+          </p:nvPr>
+        </p:nvSpPr>
+        <p:spPr>
+          <a:xfrm>
+            <a:off x="299005" y="230670"/>
+            <a:ext cx="11671322" cy="610863"/>
+          </a:xfrm>
+        </p:spPr>
+        <p:txBody>
+          <a:bodyPr vert="horz" lIns="0" tIns="0" rIns="0" bIns="0" rtlCol="0" anchor="b" anchorCtr="0">
+            <a:normAutofit/>
+          </a:bodyPr>
+          <a:lstStyle/>
+          <a:p>
+            <a:pPr algn="ctr"/>
+            <a:r>
+              <a:rPr lang="en-US" b="1" i="0" kern="1200" spc="100" baseline="0" dirty="0">
+                <a:latin typeface="+mj-lt"/>
+                <a:ea typeface="+mj-ea"/>
+                <a:cs typeface="+mj-cs"/>
+              </a:rPr>
+              <a:t>Top Emitters</a:t>
+            </a:r>
+          </a:p>
+        </p:txBody>
+      </p:sp>
+      <p:sp>
+        <p:nvSpPr>
+          <p:cNvPr id="29" name="Text Placeholder 2">
+            <a:extLst>
+              <a:ext uri="{FF2B5EF4-FFF2-40B4-BE49-F238E27FC236}">
+                <a16:creationId xmlns:a16="http://schemas.microsoft.com/office/drawing/2014/main" id="{312D0CA8-06AF-65A2-2490-C577E53226E1}"/>
+              </a:ext>
+            </a:extLst>
+          </p:cNvPr>
+          <p:cNvSpPr>
+            <a:spLocks noGrp="1"/>
+          </p:cNvSpPr>
+          <p:nvPr>
+            <p:ph type="body" sz="quarter" idx="12"/>
+          </p:nvPr>
+        </p:nvSpPr>
+        <p:spPr>
+          <a:xfrm>
+            <a:off x="3207357" y="1744164"/>
+            <a:ext cx="807423" cy="315915"/>
+          </a:xfrm>
+        </p:spPr>
+        <p:txBody>
+          <a:bodyPr vert="horz" lIns="91440" tIns="45720" rIns="91440" bIns="45720" rtlCol="0">
+            <a:noAutofit/>
+          </a:bodyPr>
+          <a:lstStyle/>
+          <a:p>
+            <a:r>
+              <a:rPr lang="en-US" sz="2400" dirty="0">
+                <a:solidFill>
+                  <a:schemeClr val="bg1"/>
+                </a:solidFill>
+              </a:rPr>
+              <a:t>N</a:t>
+            </a:r>
+            <a:r>
+              <a:rPr lang="en-US" sz="2400" b="0" i="0" kern="1200" spc="0" baseline="0" dirty="0">
+                <a:solidFill>
+                  <a:schemeClr val="bg1"/>
+                </a:solidFill>
+                <a:latin typeface="+mj-lt"/>
+                <a:ea typeface="+mn-ea"/>
+                <a:cs typeface="+mn-cs"/>
+              </a:rPr>
+              <a:t>O</a:t>
+            </a:r>
+            <a:r>
+              <a:rPr lang="en-US" sz="2400" b="0" i="0" kern="1200" spc="0" baseline="-25000" dirty="0">
+                <a:solidFill>
+                  <a:schemeClr val="bg1"/>
+                </a:solidFill>
+                <a:latin typeface="+mj-lt"/>
+                <a:ea typeface="+mn-ea"/>
+                <a:cs typeface="+mn-cs"/>
+              </a:rPr>
+              <a:t>2</a:t>
+            </a:r>
+          </a:p>
+        </p:txBody>
+      </p:sp>
+      <p:sp>
+        <p:nvSpPr>
+          <p:cNvPr id="6" name="Text Placeholder 2">
+            <a:extLst>
+              <a:ext uri="{FF2B5EF4-FFF2-40B4-BE49-F238E27FC236}">
+                <a16:creationId xmlns:a16="http://schemas.microsoft.com/office/drawing/2014/main" id="{16A9CDC5-C65C-AFCD-5218-2F7479CEACA1}"/>
+              </a:ext>
+            </a:extLst>
+          </p:cNvPr>
+          <p:cNvSpPr txBox="1">
+            <a:spLocks/>
+          </p:cNvSpPr>
+          <p:nvPr/>
+        </p:nvSpPr>
+        <p:spPr>
+          <a:xfrm>
+            <a:off x="7600208" y="1737192"/>
+            <a:ext cx="3253841" cy="315915"/>
+          </a:xfrm>
+          <a:prstGeom prst="rect">
+            <a:avLst/>
+          </a:prstGeom>
+        </p:spPr>
+        <p:txBody>
+          <a:bodyPr vert="horz" lIns="91440" tIns="45720" rIns="91440" bIns="45720" rtlCol="0">
+            <a:noAutofit/>
+          </a:bodyPr>
+          <a:lstStyle>
+            <a:lvl1pPr marL="228600" indent="-228600" algn="l" defTabSz="914400" rtl="0" eaLnBrk="1" latinLnBrk="0" hangingPunct="1">
+              <a:lnSpc>
+                <a:spcPct val="90000"/>
+              </a:lnSpc>
+              <a:spcBef>
+                <a:spcPts val="1000"/>
+              </a:spcBef>
+              <a:buFont typeface="Arial" panose="020B0604020202020204" pitchFamily="34" charset="0"/>
+              <a:buNone/>
+              <a:defRPr sz="1800" b="0" i="0" kern="1200" spc="0" baseline="0">
+                <a:solidFill>
+                  <a:schemeClr val="tx2"/>
+                </a:solidFill>
+                <a:latin typeface="+mj-lt"/>
+                <a:ea typeface="+mn-ea"/>
+                <a:cs typeface="+mn-cs"/>
+              </a:defRPr>
+            </a:lvl1pPr>
+            <a:lvl2pPr marL="685800" indent="-228600" algn="l" defTabSz="914400" rtl="0" eaLnBrk="1" latinLnBrk="0" hangingPunct="1">
+              <a:lnSpc>
+                <a:spcPct val="90000"/>
+              </a:lnSpc>
+              <a:spcBef>
+                <a:spcPts val="500"/>
+              </a:spcBef>
+              <a:buFont typeface="Arial" panose="020B0604020202020204" pitchFamily="34" charset="0"/>
+              <a:buNone/>
+              <a:defRPr sz="2400" b="0" i="0" kern="1200">
+                <a:solidFill>
+                  <a:schemeClr val="bg1"/>
+                </a:solidFill>
+                <a:latin typeface="+mn-lt"/>
+                <a:ea typeface="+mn-ea"/>
+                <a:cs typeface="+mn-cs"/>
+              </a:defRPr>
+            </a:lvl2pPr>
+            <a:lvl3pPr marL="1143000" indent="-228600" algn="l" defTabSz="914400" rtl="0" eaLnBrk="1" latinLnBrk="0" hangingPunct="1">
+              <a:lnSpc>
+                <a:spcPct val="90000"/>
+              </a:lnSpc>
+              <a:spcBef>
+                <a:spcPts val="500"/>
+              </a:spcBef>
+              <a:buFont typeface="Arial" panose="020B0604020202020204" pitchFamily="34" charset="0"/>
+              <a:buNone/>
+              <a:defRPr sz="2000" b="0" i="0" kern="1200">
+                <a:solidFill>
+                  <a:schemeClr val="bg1"/>
+                </a:solidFill>
+                <a:latin typeface="+mn-lt"/>
+                <a:ea typeface="+mn-ea"/>
+                <a:cs typeface="+mn-cs"/>
+              </a:defRPr>
+            </a:lvl3pPr>
+            <a:lvl4pPr marL="1600200" indent="-228600" algn="l" defTabSz="914400" rtl="0" eaLnBrk="1" latinLnBrk="0" hangingPunct="1">
+              <a:lnSpc>
+                <a:spcPct val="90000"/>
+              </a:lnSpc>
+              <a:spcBef>
+                <a:spcPts val="500"/>
+              </a:spcBef>
+              <a:buFont typeface="Arial" panose="020B0604020202020204" pitchFamily="34" charset="0"/>
+              <a:buNone/>
+              <a:defRPr sz="1800" b="0" i="0" kern="1200">
+                <a:solidFill>
+                  <a:schemeClr val="bg1"/>
+                </a:solidFill>
+                <a:latin typeface="+mn-lt"/>
+                <a:ea typeface="+mn-ea"/>
+                <a:cs typeface="+mn-cs"/>
+              </a:defRPr>
+            </a:lvl4pPr>
+            <a:lvl5pPr marL="2057400" indent="-228600" algn="l" defTabSz="914400" rtl="0" eaLnBrk="1" latinLnBrk="0" hangingPunct="1">
+              <a:lnSpc>
+                <a:spcPct val="90000"/>
+              </a:lnSpc>
+              <a:spcBef>
+                <a:spcPts val="500"/>
+              </a:spcBef>
+              <a:buFont typeface="Arial" panose="020B0604020202020204" pitchFamily="34" charset="0"/>
+              <a:buNone/>
+              <a:defRPr sz="1800" b="0" i="0" kern="1200">
+                <a:solidFill>
+                  <a:schemeClr val="bg1"/>
+                </a:solidFill>
+                <a:latin typeface="+mn-lt"/>
+                <a:ea typeface="+mn-ea"/>
+                <a:cs typeface="+mn-cs"/>
+              </a:defRPr>
+            </a:lvl5pPr>
+            <a:lvl6pPr marL="2514600" indent="-228600" algn="l" defTabSz="914400" rtl="0" eaLnBrk="1" latinLnBrk="0" hangingPunct="1">
+              <a:lnSpc>
+                <a:spcPct val="90000"/>
+              </a:lnSpc>
+              <a:spcBef>
+                <a:spcPts val="500"/>
+              </a:spcBef>
+              <a:buFont typeface="Arial" panose="020B0604020202020204" pitchFamily="34" charset="0"/>
+              <a:buChar char="•"/>
+              <a:defRPr sz="1800" kern="1200">
+                <a:solidFill>
+                  <a:schemeClr val="tx1"/>
+                </a:solidFill>
+                <a:latin typeface="+mn-lt"/>
+                <a:ea typeface="+mn-ea"/>
+                <a:cs typeface="+mn-cs"/>
+              </a:defRPr>
+            </a:lvl6pPr>
+            <a:lvl7pPr marL="2971800" indent="-228600" algn="l" defTabSz="914400" rtl="0" eaLnBrk="1" latinLnBrk="0" hangingPunct="1">
+              <a:lnSpc>
+                <a:spcPct val="90000"/>
+              </a:lnSpc>
+              <a:spcBef>
+                <a:spcPts val="500"/>
+              </a:spcBef>
+              <a:buFont typeface="Arial" panose="020B0604020202020204" pitchFamily="34" charset="0"/>
+              <a:buChar char="•"/>
+              <a:defRPr sz="1800" kern="1200">
+                <a:solidFill>
+                  <a:schemeClr val="tx1"/>
+                </a:solidFill>
+                <a:latin typeface="+mn-lt"/>
+                <a:ea typeface="+mn-ea"/>
+                <a:cs typeface="+mn-cs"/>
+              </a:defRPr>
+            </a:lvl7pPr>
+            <a:lvl8pPr marL="3429000" indent="-228600" algn="l" defTabSz="914400" rtl="0" eaLnBrk="1" latinLnBrk="0" hangingPunct="1">
+              <a:lnSpc>
+                <a:spcPct val="90000"/>
+              </a:lnSpc>
+              <a:spcBef>
+                <a:spcPts val="500"/>
+              </a:spcBef>
+              <a:buFont typeface="Arial" panose="020B0604020202020204" pitchFamily="34" charset="0"/>
+              <a:buChar char="•"/>
+              <a:defRPr sz="1800" kern="1200">
+                <a:solidFill>
+                  <a:schemeClr val="tx1"/>
+                </a:solidFill>
+                <a:latin typeface="+mn-lt"/>
+                <a:ea typeface="+mn-ea"/>
+                <a:cs typeface="+mn-cs"/>
+              </a:defRPr>
+            </a:lvl8pPr>
+            <a:lvl9pPr marL="3886200" indent="-228600" algn="l" defTabSz="914400" rtl="0" eaLnBrk="1" latinLnBrk="0" hangingPunct="1">
+              <a:lnSpc>
+                <a:spcPct val="90000"/>
+              </a:lnSpc>
+              <a:spcBef>
+                <a:spcPts val="500"/>
+              </a:spcBef>
+              <a:buFont typeface="Arial" panose="020B0604020202020204" pitchFamily="34" charset="0"/>
+              <a:buChar char="•"/>
+              <a:defRPr sz="1800" kern="1200">
+                <a:solidFill>
+                  <a:schemeClr val="tx1"/>
+                </a:solidFill>
+                <a:latin typeface="+mn-lt"/>
+                <a:ea typeface="+mn-ea"/>
+                <a:cs typeface="+mn-cs"/>
+              </a:defRPr>
+            </a:lvl9pPr>
+          </a:lstStyle>
+          <a:p>
+            <a:r>
+              <a:rPr lang="en-GB" sz="2400" b="1" dirty="0">
+                <a:solidFill>
+                  <a:schemeClr val="bg1"/>
+                </a:solidFill>
+                <a:latin typeface="Arial" panose="020B0604020202020204" pitchFamily="34" charset="0"/>
+                <a:cs typeface="Arial" panose="020B0604020202020204" pitchFamily="34" charset="0"/>
+              </a:rPr>
+              <a:t>Hydrofluorocarbons</a:t>
+            </a:r>
+            <a:endParaRPr lang="en-US" sz="2400" b="1" baseline="-25000" dirty="0">
+              <a:solidFill>
+                <a:schemeClr val="bg1"/>
+              </a:solidFill>
+            </a:endParaRPr>
+          </a:p>
+        </p:txBody>
+      </p:sp>
+      <p:pic>
+        <p:nvPicPr>
+          <p:cNvPr id="3" name="Picture 2" descr="Chart, pie chart&#10;&#10;Description automatically generated">
+            <a:extLst>
+              <a:ext uri="{FF2B5EF4-FFF2-40B4-BE49-F238E27FC236}">
+                <a16:creationId xmlns:a16="http://schemas.microsoft.com/office/drawing/2014/main" id="{9FC5E4F4-28DE-7AF7-9381-C9252B745AC0}"/>
+              </a:ext>
+            </a:extLst>
+          </p:cNvPr>
+          <p:cNvPicPr>
+            <a:picLocks noChangeAspect="1"/>
+          </p:cNvPicPr>
+          <p:nvPr/>
+        </p:nvPicPr>
+        <p:blipFill>
+          <a:blip r:embed="rId2">
+            <a:extLst>
+              <a:ext uri="{28A0092B-C50C-407E-A947-70E740481C1C}">
+                <a14:useLocalDpi xmlns:a14="http://schemas.microsoft.com/office/drawing/2010/main" val="0"/>
+              </a:ext>
+            </a:extLst>
+          </a:blip>
+          <a:stretch>
+            <a:fillRect/>
+          </a:stretch>
+        </p:blipFill>
+        <p:spPr>
+          <a:xfrm>
+            <a:off x="872074" y="2277002"/>
+            <a:ext cx="4963461" cy="4141027"/>
+          </a:xfrm>
+          <a:prstGeom prst="rect">
+            <a:avLst/>
+          </a:prstGeom>
+        </p:spPr>
+      </p:pic>
+      <p:pic>
+        <p:nvPicPr>
+          <p:cNvPr id="7" name="Picture 6" descr="Chart, pie chart&#10;&#10;Description automatically generated">
+            <a:extLst>
+              <a:ext uri="{FF2B5EF4-FFF2-40B4-BE49-F238E27FC236}">
+                <a16:creationId xmlns:a16="http://schemas.microsoft.com/office/drawing/2014/main" id="{D2329019-4B1C-0700-EE7A-3D177A7C1077}"/>
+              </a:ext>
+            </a:extLst>
+          </p:cNvPr>
+          <p:cNvPicPr>
+            <a:picLocks noChangeAspect="1"/>
+          </p:cNvPicPr>
+          <p:nvPr/>
+        </p:nvPicPr>
+        <p:blipFill>
+          <a:blip r:embed="rId3">
+            <a:extLst>
+              <a:ext uri="{28A0092B-C50C-407E-A947-70E740481C1C}">
+                <a14:useLocalDpi xmlns:a14="http://schemas.microsoft.com/office/drawing/2010/main" val="0"/>
+              </a:ext>
+            </a:extLst>
+          </a:blip>
+          <a:stretch>
+            <a:fillRect/>
+          </a:stretch>
+        </p:blipFill>
+        <p:spPr>
+          <a:xfrm>
+            <a:off x="5907467" y="2302004"/>
+            <a:ext cx="6284533" cy="4325326"/>
+          </a:xfrm>
+          <a:prstGeom prst="rect">
+            <a:avLst/>
+          </a:prstGeom>
+        </p:spPr>
+      </p:pic>
+    </p:spTree>
+    <p:extLst>
+      <p:ext uri="{BB962C8B-B14F-4D97-AF65-F5344CB8AC3E}">
+        <p14:creationId xmlns:p14="http://schemas.microsoft.com/office/powerpoint/2010/main" val="2312961950"/>
+      </p:ext>
+    </p:extLst>
+  </p:cSld>
+  <p:clrMapOvr>
+    <a:masterClrMapping/>
+  </p:clrMapOvr>
+</p:sld>
+</file>
+
+<file path=ppt/slides/slide16.xml><?xml version="1.0" encoding="utf-8"?>
+<p:sld xmlns:a="http://schemas.openxmlformats.org/drawingml/2006/main" xmlns:r="http://schemas.openxmlformats.org/officeDocument/2006/relationships" xmlns:p="http://schemas.openxmlformats.org/presentationml/2006/main">
+  <p:cSld>
+    <p:spTree>
+      <p:nvGrpSpPr>
+        <p:cNvPr id="1" name=""/>
+        <p:cNvGrpSpPr/>
+        <p:nvPr/>
+      </p:nvGrpSpPr>
+      <p:grpSpPr>
+        <a:xfrm>
+          <a:off x="0" y="0"/>
+          <a:ext cx="0" cy="0"/>
+          <a:chOff x="0" y="0"/>
+          <a:chExt cx="0" cy="0"/>
+        </a:xfrm>
+      </p:grpSpPr>
+      <p:sp>
+        <p:nvSpPr>
+          <p:cNvPr id="2" name="Title 1">
+            <a:extLst>
+              <a:ext uri="{FF2B5EF4-FFF2-40B4-BE49-F238E27FC236}">
+                <a16:creationId xmlns:a16="http://schemas.microsoft.com/office/drawing/2014/main" id="{8C122DF8-59D4-D94D-8ED9-F2F319899DBF}"/>
+              </a:ext>
+            </a:extLst>
+          </p:cNvPr>
+          <p:cNvSpPr>
+            <a:spLocks noGrp="1"/>
+          </p:cNvSpPr>
+          <p:nvPr>
+            <p:ph type="title"/>
+          </p:nvPr>
+        </p:nvSpPr>
+        <p:spPr>
+          <a:xfrm>
+            <a:off x="415383" y="216232"/>
+            <a:ext cx="4941477" cy="610863"/>
+          </a:xfrm>
+        </p:spPr>
+        <p:txBody>
+          <a:bodyPr/>
+          <a:lstStyle/>
+          <a:p>
+            <a:r>
+              <a:rPr lang="en-US" dirty="0"/>
+              <a:t>SUMMARY</a:t>
+            </a:r>
+          </a:p>
+        </p:txBody>
+      </p:sp>
+      <p:sp>
+        <p:nvSpPr>
+          <p:cNvPr id="45" name="Text Placeholder 44">
+            <a:extLst>
+              <a:ext uri="{FF2B5EF4-FFF2-40B4-BE49-F238E27FC236}">
+                <a16:creationId xmlns:a16="http://schemas.microsoft.com/office/drawing/2014/main" id="{803A1E73-C790-447A-974F-B3ADB50149F7}"/>
+              </a:ext>
+            </a:extLst>
+          </p:cNvPr>
+          <p:cNvSpPr>
+            <a:spLocks noGrp="1"/>
+          </p:cNvSpPr>
+          <p:nvPr>
+            <p:ph type="body" sz="quarter" idx="12"/>
+          </p:nvPr>
+        </p:nvSpPr>
+        <p:spPr>
+          <a:xfrm>
+            <a:off x="865935" y="1045439"/>
+            <a:ext cx="9355282" cy="370904"/>
+          </a:xfrm>
+        </p:spPr>
+        <p:txBody>
+          <a:bodyPr/>
+          <a:lstStyle/>
+          <a:p>
+            <a:r>
+              <a:rPr lang="en-US" dirty="0">
+                <a:solidFill>
+                  <a:schemeClr val="bg1"/>
+                </a:solidFill>
+              </a:rPr>
+              <a:t>WHO – MAJOR SECTORS RESPONSIBLE</a:t>
+            </a:r>
+          </a:p>
+        </p:txBody>
+      </p:sp>
+      <p:sp>
+        <p:nvSpPr>
+          <p:cNvPr id="44" name="Text Placeholder 43">
+            <a:extLst>
+              <a:ext uri="{FF2B5EF4-FFF2-40B4-BE49-F238E27FC236}">
+                <a16:creationId xmlns:a16="http://schemas.microsoft.com/office/drawing/2014/main" id="{906E4DF9-127F-4650-8BAA-2521A37885B0}"/>
+              </a:ext>
+            </a:extLst>
+          </p:cNvPr>
+          <p:cNvSpPr>
+            <a:spLocks noGrp="1"/>
+          </p:cNvSpPr>
+          <p:nvPr>
+            <p:ph type="body" sz="quarter" idx="10"/>
+          </p:nvPr>
+        </p:nvSpPr>
+        <p:spPr>
+          <a:xfrm>
+            <a:off x="949062" y="1545553"/>
+            <a:ext cx="9854045" cy="370904"/>
+          </a:xfrm>
+        </p:spPr>
+        <p:txBody>
+          <a:bodyPr/>
+          <a:lstStyle/>
+          <a:p>
+            <a:r>
+              <a:rPr lang="en-US" sz="2000" dirty="0">
+                <a:solidFill>
+                  <a:srgbClr val="FF0000"/>
+                </a:solidFill>
+              </a:rPr>
+              <a:t>Agriculture, </a:t>
+            </a:r>
+          </a:p>
+          <a:p>
+            <a:r>
+              <a:rPr lang="en-US" sz="2000" dirty="0">
+                <a:solidFill>
+                  <a:srgbClr val="FF0000"/>
+                </a:solidFill>
+              </a:rPr>
+              <a:t>Business, </a:t>
+            </a:r>
+          </a:p>
+          <a:p>
+            <a:r>
+              <a:rPr lang="en-US" sz="2000" dirty="0">
+                <a:solidFill>
+                  <a:srgbClr val="FF0000"/>
+                </a:solidFill>
+              </a:rPr>
+              <a:t>Transport, </a:t>
+            </a:r>
+          </a:p>
+          <a:p>
+            <a:r>
+              <a:rPr lang="en-US" sz="2000" dirty="0">
+                <a:solidFill>
+                  <a:srgbClr val="FF0000"/>
+                </a:solidFill>
+              </a:rPr>
+              <a:t>Energy</a:t>
+            </a:r>
+          </a:p>
+          <a:p>
+            <a:r>
+              <a:rPr lang="en-US" sz="2000" dirty="0">
+                <a:solidFill>
+                  <a:srgbClr val="FF0000"/>
+                </a:solidFill>
+              </a:rPr>
+              <a:t>Land-related activities </a:t>
+            </a:r>
+          </a:p>
+        </p:txBody>
+      </p:sp>
+      <p:sp>
+        <p:nvSpPr>
+          <p:cNvPr id="51" name="Text Placeholder 50">
+            <a:extLst>
+              <a:ext uri="{FF2B5EF4-FFF2-40B4-BE49-F238E27FC236}">
+                <a16:creationId xmlns:a16="http://schemas.microsoft.com/office/drawing/2014/main" id="{D582AC9C-B267-4C04-9E50-051DE433538C}"/>
+              </a:ext>
+            </a:extLst>
+          </p:cNvPr>
+          <p:cNvSpPr>
+            <a:spLocks noGrp="1"/>
+          </p:cNvSpPr>
+          <p:nvPr>
+            <p:ph type="body" sz="quarter" idx="18"/>
+          </p:nvPr>
+        </p:nvSpPr>
+        <p:spPr>
+          <a:xfrm>
+            <a:off x="949062" y="3732947"/>
+            <a:ext cx="4838700" cy="315915"/>
+          </a:xfrm>
+        </p:spPr>
+        <p:txBody>
+          <a:bodyPr/>
+          <a:lstStyle/>
+          <a:p>
+            <a:r>
+              <a:rPr lang="en-US" dirty="0">
+                <a:solidFill>
+                  <a:schemeClr val="bg1"/>
+                </a:solidFill>
+              </a:rPr>
+              <a:t>TREND</a:t>
+            </a:r>
+          </a:p>
+        </p:txBody>
+      </p:sp>
+      <p:sp>
+        <p:nvSpPr>
+          <p:cNvPr id="53" name="Text Placeholder 52">
+            <a:extLst>
+              <a:ext uri="{FF2B5EF4-FFF2-40B4-BE49-F238E27FC236}">
+                <a16:creationId xmlns:a16="http://schemas.microsoft.com/office/drawing/2014/main" id="{A1B673DD-4FEC-4191-8446-77B89805FF2B}"/>
+              </a:ext>
+            </a:extLst>
+          </p:cNvPr>
+          <p:cNvSpPr>
+            <a:spLocks noGrp="1"/>
+          </p:cNvSpPr>
+          <p:nvPr>
+            <p:ph type="body" sz="quarter" idx="20"/>
+          </p:nvPr>
+        </p:nvSpPr>
+        <p:spPr>
+          <a:xfrm>
+            <a:off x="5416448" y="3730487"/>
+            <a:ext cx="6506378" cy="2642592"/>
+          </a:xfrm>
+        </p:spPr>
+        <p:txBody>
+          <a:bodyPr/>
+          <a:lstStyle/>
+          <a:p>
+            <a:r>
+              <a:rPr lang="en-US" dirty="0">
+                <a:solidFill>
+                  <a:schemeClr val="bg1"/>
+                </a:solidFill>
+              </a:rPr>
+              <a:t>CONCLUSION</a:t>
+            </a:r>
+          </a:p>
+          <a:p>
+            <a:pPr marL="285750" indent="-285750">
+              <a:buFont typeface="Arial" panose="020B0604020202020204" pitchFamily="34" charset="0"/>
+              <a:buChar char="•"/>
+            </a:pPr>
+            <a:r>
+              <a:rPr lang="en-US" dirty="0">
+                <a:solidFill>
+                  <a:srgbClr val="00B050"/>
+                </a:solidFill>
+                <a:latin typeface="+mn-lt"/>
+              </a:rPr>
+              <a:t>There still exists an upward trend in the activities of the major contributing sectors</a:t>
+            </a:r>
+          </a:p>
+          <a:p>
+            <a:pPr marL="285750" indent="-285750">
+              <a:buFont typeface="Arial" panose="020B0604020202020204" pitchFamily="34" charset="0"/>
+              <a:buChar char="•"/>
+            </a:pPr>
+            <a:r>
+              <a:rPr lang="en-US" dirty="0">
+                <a:solidFill>
+                  <a:srgbClr val="00B050"/>
+                </a:solidFill>
+                <a:latin typeface="+mn-lt"/>
+              </a:rPr>
+              <a:t>The policy makers need to take stringent urgent measures that ensures current practices are rapidly transformed to  slow the release of the greenhouse gas emission</a:t>
+            </a:r>
+          </a:p>
+          <a:p>
+            <a:pPr marL="285750" indent="-285750">
+              <a:buFont typeface="Arial" panose="020B0604020202020204" pitchFamily="34" charset="0"/>
+              <a:buChar char="•"/>
+            </a:pPr>
+            <a:r>
+              <a:rPr lang="en-US" dirty="0">
+                <a:solidFill>
+                  <a:srgbClr val="00B050"/>
+                </a:solidFill>
+                <a:latin typeface="+mn-lt"/>
+              </a:rPr>
+              <a:t>Alternatively we should also look into modalities to capture and transform already released gases to limit its damages.</a:t>
+            </a:r>
+          </a:p>
+        </p:txBody>
+      </p:sp>
+      <p:sp>
+        <p:nvSpPr>
+          <p:cNvPr id="12" name="Text Placeholder 44">
+            <a:extLst>
+              <a:ext uri="{FF2B5EF4-FFF2-40B4-BE49-F238E27FC236}">
+                <a16:creationId xmlns:a16="http://schemas.microsoft.com/office/drawing/2014/main" id="{D997FB42-8F47-B53A-F9F7-5F4815C42C46}"/>
+              </a:ext>
+            </a:extLst>
+          </p:cNvPr>
+          <p:cNvSpPr txBox="1">
+            <a:spLocks/>
+          </p:cNvSpPr>
+          <p:nvPr/>
+        </p:nvSpPr>
+        <p:spPr>
+          <a:xfrm>
+            <a:off x="5409052" y="1057794"/>
+            <a:ext cx="4838700" cy="531868"/>
+          </a:xfrm>
+          <a:prstGeom prst="rect">
+            <a:avLst/>
+          </a:prstGeom>
+        </p:spPr>
+        <p:txBody>
+          <a:bodyPr vert="horz" lIns="91440" tIns="45720" rIns="91440" bIns="45720" rtlCol="0">
+            <a:noAutofit/>
+          </a:bodyPr>
+          <a:lstStyle>
+            <a:lvl1pPr marL="228600" indent="-228600" algn="l" defTabSz="914400" rtl="0" eaLnBrk="1" latinLnBrk="0" hangingPunct="1">
+              <a:lnSpc>
+                <a:spcPct val="90000"/>
+              </a:lnSpc>
+              <a:spcBef>
+                <a:spcPts val="1000"/>
+              </a:spcBef>
+              <a:buFont typeface="Arial" panose="020B0604020202020204" pitchFamily="34" charset="0"/>
+              <a:buNone/>
+              <a:defRPr sz="1800" b="0" i="0" kern="1200" spc="0" baseline="0">
+                <a:solidFill>
+                  <a:schemeClr val="tx2"/>
+                </a:solidFill>
+                <a:latin typeface="+mj-lt"/>
+                <a:ea typeface="+mn-ea"/>
+                <a:cs typeface="+mn-cs"/>
+              </a:defRPr>
+            </a:lvl1pPr>
+            <a:lvl2pPr marL="685800" indent="-228600" algn="l" defTabSz="914400" rtl="0" eaLnBrk="1" latinLnBrk="0" hangingPunct="1">
+              <a:lnSpc>
+                <a:spcPct val="90000"/>
+              </a:lnSpc>
+              <a:spcBef>
+                <a:spcPts val="500"/>
+              </a:spcBef>
+              <a:buFont typeface="Arial" panose="020B0604020202020204" pitchFamily="34" charset="0"/>
+              <a:buNone/>
+              <a:defRPr sz="2400" b="0" i="0" kern="1200">
+                <a:solidFill>
+                  <a:schemeClr val="bg1"/>
+                </a:solidFill>
+                <a:latin typeface="+mn-lt"/>
+                <a:ea typeface="+mn-ea"/>
+                <a:cs typeface="+mn-cs"/>
+              </a:defRPr>
+            </a:lvl2pPr>
+            <a:lvl3pPr marL="1143000" indent="-228600" algn="l" defTabSz="914400" rtl="0" eaLnBrk="1" latinLnBrk="0" hangingPunct="1">
+              <a:lnSpc>
+                <a:spcPct val="90000"/>
+              </a:lnSpc>
+              <a:spcBef>
+                <a:spcPts val="500"/>
+              </a:spcBef>
+              <a:buFont typeface="Arial" panose="020B0604020202020204" pitchFamily="34" charset="0"/>
+              <a:buNone/>
+              <a:defRPr sz="2000" b="0" i="0" kern="1200">
+                <a:solidFill>
+                  <a:schemeClr val="bg1"/>
+                </a:solidFill>
+                <a:latin typeface="+mn-lt"/>
+                <a:ea typeface="+mn-ea"/>
+                <a:cs typeface="+mn-cs"/>
+              </a:defRPr>
+            </a:lvl3pPr>
+            <a:lvl4pPr marL="1600200" indent="-228600" algn="l" defTabSz="914400" rtl="0" eaLnBrk="1" latinLnBrk="0" hangingPunct="1">
+              <a:lnSpc>
+                <a:spcPct val="90000"/>
+              </a:lnSpc>
+              <a:spcBef>
+                <a:spcPts val="500"/>
+              </a:spcBef>
+              <a:buFont typeface="Arial" panose="020B0604020202020204" pitchFamily="34" charset="0"/>
+              <a:buNone/>
+              <a:defRPr sz="1800" b="0" i="0" kern="1200">
+                <a:solidFill>
+                  <a:schemeClr val="bg1"/>
+                </a:solidFill>
+                <a:latin typeface="+mn-lt"/>
+                <a:ea typeface="+mn-ea"/>
+                <a:cs typeface="+mn-cs"/>
+              </a:defRPr>
+            </a:lvl4pPr>
+            <a:lvl5pPr marL="2057400" indent="-228600" algn="l" defTabSz="914400" rtl="0" eaLnBrk="1" latinLnBrk="0" hangingPunct="1">
+              <a:lnSpc>
+                <a:spcPct val="90000"/>
+              </a:lnSpc>
+              <a:spcBef>
+                <a:spcPts val="500"/>
+              </a:spcBef>
+              <a:buFont typeface="Arial" panose="020B0604020202020204" pitchFamily="34" charset="0"/>
+              <a:buNone/>
+              <a:defRPr sz="1800" b="0" i="0" kern="1200">
+                <a:solidFill>
+                  <a:schemeClr val="bg1"/>
+                </a:solidFill>
+                <a:latin typeface="+mn-lt"/>
+                <a:ea typeface="+mn-ea"/>
+                <a:cs typeface="+mn-cs"/>
+              </a:defRPr>
+            </a:lvl5pPr>
+            <a:lvl6pPr marL="2514600" indent="-228600" algn="l" defTabSz="914400" rtl="0" eaLnBrk="1" latinLnBrk="0" hangingPunct="1">
+              <a:lnSpc>
+                <a:spcPct val="90000"/>
+              </a:lnSpc>
+              <a:spcBef>
+                <a:spcPts val="500"/>
+              </a:spcBef>
+              <a:buFont typeface="Arial" panose="020B0604020202020204" pitchFamily="34" charset="0"/>
+              <a:buChar char="•"/>
+              <a:defRPr sz="1800" kern="1200">
+                <a:solidFill>
+                  <a:schemeClr val="tx1"/>
+                </a:solidFill>
+                <a:latin typeface="+mn-lt"/>
+                <a:ea typeface="+mn-ea"/>
+                <a:cs typeface="+mn-cs"/>
+              </a:defRPr>
+            </a:lvl6pPr>
+            <a:lvl7pPr marL="2971800" indent="-228600" algn="l" defTabSz="914400" rtl="0" eaLnBrk="1" latinLnBrk="0" hangingPunct="1">
+              <a:lnSpc>
+                <a:spcPct val="90000"/>
+              </a:lnSpc>
+              <a:spcBef>
+                <a:spcPts val="500"/>
+              </a:spcBef>
+              <a:buFont typeface="Arial" panose="020B0604020202020204" pitchFamily="34" charset="0"/>
+              <a:buChar char="•"/>
+              <a:defRPr sz="1800" kern="1200">
+                <a:solidFill>
+                  <a:schemeClr val="tx1"/>
+                </a:solidFill>
+                <a:latin typeface="+mn-lt"/>
+                <a:ea typeface="+mn-ea"/>
+                <a:cs typeface="+mn-cs"/>
+              </a:defRPr>
+            </a:lvl7pPr>
+            <a:lvl8pPr marL="3429000" indent="-228600" algn="l" defTabSz="914400" rtl="0" eaLnBrk="1" latinLnBrk="0" hangingPunct="1">
+              <a:lnSpc>
+                <a:spcPct val="90000"/>
+              </a:lnSpc>
+              <a:spcBef>
+                <a:spcPts val="500"/>
+              </a:spcBef>
+              <a:buFont typeface="Arial" panose="020B0604020202020204" pitchFamily="34" charset="0"/>
+              <a:buChar char="•"/>
+              <a:defRPr sz="1800" kern="1200">
+                <a:solidFill>
+                  <a:schemeClr val="tx1"/>
+                </a:solidFill>
+                <a:latin typeface="+mn-lt"/>
+                <a:ea typeface="+mn-ea"/>
+                <a:cs typeface="+mn-cs"/>
+              </a:defRPr>
+            </a:lvl8pPr>
+            <a:lvl9pPr marL="3886200" indent="-228600" algn="l" defTabSz="914400" rtl="0" eaLnBrk="1" latinLnBrk="0" hangingPunct="1">
+              <a:lnSpc>
+                <a:spcPct val="90000"/>
+              </a:lnSpc>
+              <a:spcBef>
+                <a:spcPts val="500"/>
+              </a:spcBef>
+              <a:buFont typeface="Arial" panose="020B0604020202020204" pitchFamily="34" charset="0"/>
+              <a:buChar char="•"/>
+              <a:defRPr sz="1800" kern="1200">
+                <a:solidFill>
+                  <a:schemeClr val="tx1"/>
+                </a:solidFill>
+                <a:latin typeface="+mn-lt"/>
+                <a:ea typeface="+mn-ea"/>
+                <a:cs typeface="+mn-cs"/>
+              </a:defRPr>
+            </a:lvl9pPr>
+          </a:lstStyle>
+          <a:p>
+            <a:r>
+              <a:rPr lang="en-US" dirty="0">
+                <a:solidFill>
+                  <a:schemeClr val="bg1"/>
+                </a:solidFill>
+              </a:rPr>
+              <a:t>TOP ACTIVITIES</a:t>
+            </a:r>
+          </a:p>
+        </p:txBody>
+      </p:sp>
+      <p:sp>
+        <p:nvSpPr>
+          <p:cNvPr id="13" name="Text Placeholder 43">
+            <a:extLst>
+              <a:ext uri="{FF2B5EF4-FFF2-40B4-BE49-F238E27FC236}">
+                <a16:creationId xmlns:a16="http://schemas.microsoft.com/office/drawing/2014/main" id="{65F714D7-D48E-C647-0E05-804C0C68C118}"/>
+              </a:ext>
+            </a:extLst>
+          </p:cNvPr>
+          <p:cNvSpPr txBox="1">
+            <a:spLocks/>
+          </p:cNvSpPr>
+          <p:nvPr/>
+        </p:nvSpPr>
+        <p:spPr>
+          <a:xfrm>
+            <a:off x="5416448" y="1449235"/>
+            <a:ext cx="6055369" cy="2101488"/>
+          </a:xfrm>
+          <a:prstGeom prst="rect">
+            <a:avLst/>
+          </a:prstGeom>
+        </p:spPr>
+        <p:txBody>
+          <a:bodyPr vert="horz" lIns="91440" tIns="45720" rIns="91440" bIns="45720" rtlCol="0">
+            <a:noAutofit/>
+          </a:bodyPr>
+          <a:lstStyle>
+            <a:lvl1pPr marL="0" indent="0" algn="l" defTabSz="914400" rtl="0" eaLnBrk="1" latinLnBrk="0" hangingPunct="1">
+              <a:lnSpc>
+                <a:spcPct val="90000"/>
+              </a:lnSpc>
+              <a:spcBef>
+                <a:spcPts val="1000"/>
+              </a:spcBef>
+              <a:buFont typeface="Arial" panose="020B0604020202020204" pitchFamily="34" charset="0"/>
+              <a:buNone/>
+              <a:defRPr sz="1600" b="0" i="0" kern="1200">
+                <a:solidFill>
+                  <a:schemeClr val="bg1"/>
+                </a:solidFill>
+                <a:latin typeface="+mn-lt"/>
+                <a:ea typeface="+mn-ea"/>
+                <a:cs typeface="+mn-cs"/>
+              </a:defRPr>
+            </a:lvl1pPr>
+            <a:lvl2pPr marL="685800" indent="-228600" algn="l" defTabSz="914400" rtl="0" eaLnBrk="1" latinLnBrk="0" hangingPunct="1">
+              <a:lnSpc>
+                <a:spcPct val="90000"/>
+              </a:lnSpc>
+              <a:spcBef>
+                <a:spcPts val="500"/>
+              </a:spcBef>
+              <a:buFont typeface="Arial" panose="020B0604020202020204" pitchFamily="34" charset="0"/>
+              <a:buChar char="•"/>
+              <a:defRPr sz="2400" b="0" i="0" kern="1200">
+                <a:solidFill>
+                  <a:schemeClr val="bg1"/>
+                </a:solidFill>
+                <a:latin typeface="+mn-lt"/>
+                <a:ea typeface="+mn-ea"/>
+                <a:cs typeface="+mn-cs"/>
+              </a:defRPr>
+            </a:lvl2pPr>
+            <a:lvl3pPr marL="1143000" indent="-228600" algn="l" defTabSz="914400" rtl="0" eaLnBrk="1" latinLnBrk="0" hangingPunct="1">
+              <a:lnSpc>
+                <a:spcPct val="90000"/>
+              </a:lnSpc>
+              <a:spcBef>
+                <a:spcPts val="500"/>
+              </a:spcBef>
+              <a:buFont typeface="Arial" panose="020B0604020202020204" pitchFamily="34" charset="0"/>
+              <a:buChar char="•"/>
+              <a:defRPr sz="2000" b="0" i="0" kern="1200">
+                <a:solidFill>
+                  <a:schemeClr val="bg1"/>
+                </a:solidFill>
+                <a:latin typeface="+mn-lt"/>
+                <a:ea typeface="+mn-ea"/>
+                <a:cs typeface="+mn-cs"/>
+              </a:defRPr>
+            </a:lvl3pPr>
+            <a:lvl4pPr marL="1600200" indent="-228600" algn="l" defTabSz="914400" rtl="0" eaLnBrk="1" latinLnBrk="0" hangingPunct="1">
+              <a:lnSpc>
+                <a:spcPct val="90000"/>
+              </a:lnSpc>
+              <a:spcBef>
+                <a:spcPts val="500"/>
+              </a:spcBef>
+              <a:buFont typeface="Arial" panose="020B0604020202020204" pitchFamily="34" charset="0"/>
+              <a:buChar char="•"/>
+              <a:defRPr sz="1800" b="0" i="0" kern="1200">
+                <a:solidFill>
+                  <a:schemeClr val="bg1"/>
+                </a:solidFill>
+                <a:latin typeface="+mn-lt"/>
+                <a:ea typeface="+mn-ea"/>
+                <a:cs typeface="+mn-cs"/>
+              </a:defRPr>
+            </a:lvl4pPr>
+            <a:lvl5pPr marL="2057400" indent="-228600" algn="l" defTabSz="914400" rtl="0" eaLnBrk="1" latinLnBrk="0" hangingPunct="1">
+              <a:lnSpc>
+                <a:spcPct val="90000"/>
+              </a:lnSpc>
+              <a:spcBef>
+                <a:spcPts val="500"/>
+              </a:spcBef>
+              <a:buFont typeface="Arial" panose="020B0604020202020204" pitchFamily="34" charset="0"/>
+              <a:buChar char="•"/>
+              <a:defRPr sz="1800" b="0" i="0" kern="1200">
+                <a:solidFill>
+                  <a:schemeClr val="bg1"/>
+                </a:solidFill>
+                <a:latin typeface="+mn-lt"/>
+                <a:ea typeface="+mn-ea"/>
+                <a:cs typeface="+mn-cs"/>
+              </a:defRPr>
+            </a:lvl5pPr>
+            <a:lvl6pPr marL="2514600" indent="-228600" algn="l" defTabSz="914400" rtl="0" eaLnBrk="1" latinLnBrk="0" hangingPunct="1">
+              <a:lnSpc>
+                <a:spcPct val="90000"/>
+              </a:lnSpc>
+              <a:spcBef>
+                <a:spcPts val="500"/>
+              </a:spcBef>
+              <a:buFont typeface="Arial" panose="020B0604020202020204" pitchFamily="34" charset="0"/>
+              <a:buChar char="•"/>
+              <a:defRPr sz="1800" kern="1200">
+                <a:solidFill>
+                  <a:schemeClr val="tx1"/>
+                </a:solidFill>
+                <a:latin typeface="+mn-lt"/>
+                <a:ea typeface="+mn-ea"/>
+                <a:cs typeface="+mn-cs"/>
+              </a:defRPr>
+            </a:lvl6pPr>
+            <a:lvl7pPr marL="2971800" indent="-228600" algn="l" defTabSz="914400" rtl="0" eaLnBrk="1" latinLnBrk="0" hangingPunct="1">
+              <a:lnSpc>
+                <a:spcPct val="90000"/>
+              </a:lnSpc>
+              <a:spcBef>
+                <a:spcPts val="500"/>
+              </a:spcBef>
+              <a:buFont typeface="Arial" panose="020B0604020202020204" pitchFamily="34" charset="0"/>
+              <a:buChar char="•"/>
+              <a:defRPr sz="1800" kern="1200">
+                <a:solidFill>
+                  <a:schemeClr val="tx1"/>
+                </a:solidFill>
+                <a:latin typeface="+mn-lt"/>
+                <a:ea typeface="+mn-ea"/>
+                <a:cs typeface="+mn-cs"/>
+              </a:defRPr>
+            </a:lvl7pPr>
+            <a:lvl8pPr marL="3429000" indent="-228600" algn="l" defTabSz="914400" rtl="0" eaLnBrk="1" latinLnBrk="0" hangingPunct="1">
+              <a:lnSpc>
+                <a:spcPct val="90000"/>
+              </a:lnSpc>
+              <a:spcBef>
+                <a:spcPts val="500"/>
+              </a:spcBef>
+              <a:buFont typeface="Arial" panose="020B0604020202020204" pitchFamily="34" charset="0"/>
+              <a:buChar char="•"/>
+              <a:defRPr sz="1800" kern="1200">
+                <a:solidFill>
+                  <a:schemeClr val="tx1"/>
+                </a:solidFill>
+                <a:latin typeface="+mn-lt"/>
+                <a:ea typeface="+mn-ea"/>
+                <a:cs typeface="+mn-cs"/>
+              </a:defRPr>
+            </a:lvl8pPr>
+            <a:lvl9pPr marL="3886200" indent="-228600" algn="l" defTabSz="914400" rtl="0" eaLnBrk="1" latinLnBrk="0" hangingPunct="1">
+              <a:lnSpc>
+                <a:spcPct val="90000"/>
+              </a:lnSpc>
+              <a:spcBef>
+                <a:spcPts val="500"/>
+              </a:spcBef>
+              <a:buFont typeface="Arial" panose="020B0604020202020204" pitchFamily="34" charset="0"/>
+              <a:buChar char="•"/>
+              <a:defRPr sz="1800" kern="1200">
+                <a:solidFill>
+                  <a:schemeClr val="tx1"/>
+                </a:solidFill>
+                <a:latin typeface="+mn-lt"/>
+                <a:ea typeface="+mn-ea"/>
+                <a:cs typeface="+mn-cs"/>
+              </a:defRPr>
+            </a:lvl9pPr>
+          </a:lstStyle>
+          <a:p>
+            <a:pPr marL="177750" indent="-285750">
+              <a:lnSpc>
+                <a:spcPts val="2160"/>
+              </a:lnSpc>
+              <a:spcBef>
+                <a:spcPts val="0"/>
+              </a:spcBef>
+              <a:buFont typeface="Arial" panose="020B0604020202020204" pitchFamily="34" charset="0"/>
+              <a:buChar char="•"/>
+            </a:pPr>
+            <a:r>
+              <a:rPr lang="en-GB" sz="1800" dirty="0">
+                <a:solidFill>
+                  <a:srgbClr val="FF0000"/>
+                </a:solidFill>
+              </a:rPr>
+              <a:t>Refrigeration and air conditioning, </a:t>
+            </a:r>
+          </a:p>
+          <a:p>
+            <a:pPr marL="177750" indent="-285750">
+              <a:lnSpc>
+                <a:spcPts val="2160"/>
+              </a:lnSpc>
+              <a:spcBef>
+                <a:spcPts val="0"/>
+              </a:spcBef>
+              <a:buFont typeface="Arial" panose="020B0604020202020204" pitchFamily="34" charset="0"/>
+              <a:buChar char="•"/>
+            </a:pPr>
+            <a:r>
+              <a:rPr lang="en-GB" sz="1800" dirty="0">
+                <a:solidFill>
+                  <a:srgbClr val="FF0000"/>
+                </a:solidFill>
+              </a:rPr>
+              <a:t>Soil emission (direct and indirect), </a:t>
+            </a:r>
+          </a:p>
+          <a:p>
+            <a:pPr marL="177750" indent="-285750">
+              <a:lnSpc>
+                <a:spcPts val="2160"/>
+              </a:lnSpc>
+              <a:spcBef>
+                <a:spcPts val="0"/>
+              </a:spcBef>
+              <a:buFont typeface="Arial" panose="020B0604020202020204" pitchFamily="34" charset="0"/>
+              <a:buChar char="•"/>
+            </a:pPr>
+            <a:r>
+              <a:rPr lang="en-GB" sz="1800" dirty="0">
+                <a:solidFill>
+                  <a:srgbClr val="FF0000"/>
+                </a:solidFill>
+              </a:rPr>
+              <a:t>Industrial combustion and electricity, </a:t>
+            </a:r>
+          </a:p>
+          <a:p>
+            <a:pPr marL="177750" indent="-285750">
+              <a:lnSpc>
+                <a:spcPts val="2160"/>
+              </a:lnSpc>
+              <a:spcBef>
+                <a:spcPts val="0"/>
+              </a:spcBef>
+              <a:buFont typeface="Arial" panose="020B0604020202020204" pitchFamily="34" charset="0"/>
+              <a:buChar char="•"/>
+            </a:pPr>
+            <a:r>
+              <a:rPr lang="en-GB" sz="1800" dirty="0">
+                <a:solidFill>
+                  <a:srgbClr val="FF0000"/>
+                </a:solidFill>
+              </a:rPr>
+              <a:t>Cattle &amp; Pig wastes, </a:t>
+            </a:r>
+          </a:p>
+          <a:p>
+            <a:pPr marL="177750" indent="-285750">
+              <a:lnSpc>
+                <a:spcPts val="2160"/>
+              </a:lnSpc>
+              <a:spcBef>
+                <a:spcPts val="0"/>
+              </a:spcBef>
+              <a:buFont typeface="Arial" panose="020B0604020202020204" pitchFamily="34" charset="0"/>
+              <a:buChar char="•"/>
+            </a:pPr>
+            <a:r>
+              <a:rPr lang="en-GB" sz="1800" dirty="0">
+                <a:solidFill>
+                  <a:srgbClr val="FF0000"/>
+                </a:solidFill>
+              </a:rPr>
+              <a:t>Power stations, </a:t>
+            </a:r>
+          </a:p>
+          <a:p>
+            <a:pPr marL="177750" indent="-285750">
+              <a:lnSpc>
+                <a:spcPts val="2160"/>
+              </a:lnSpc>
+              <a:spcBef>
+                <a:spcPts val="0"/>
+              </a:spcBef>
+              <a:buFont typeface="Arial" panose="020B0604020202020204" pitchFamily="34" charset="0"/>
+              <a:buChar char="•"/>
+            </a:pPr>
+            <a:r>
+              <a:rPr lang="en-GB" sz="1800" dirty="0">
+                <a:solidFill>
+                  <a:srgbClr val="FF0000"/>
+                </a:solidFill>
+              </a:rPr>
+              <a:t>Residential combustion, </a:t>
+            </a:r>
+          </a:p>
+          <a:p>
+            <a:pPr marL="177750" indent="-285750">
+              <a:lnSpc>
+                <a:spcPts val="2160"/>
+              </a:lnSpc>
+              <a:spcBef>
+                <a:spcPts val="0"/>
+              </a:spcBef>
+              <a:buFont typeface="Arial" panose="020B0604020202020204" pitchFamily="34" charset="0"/>
+              <a:buChar char="•"/>
+            </a:pPr>
+            <a:r>
+              <a:rPr lang="en-GB" sz="1800" dirty="0">
+                <a:solidFill>
+                  <a:srgbClr val="FF0000"/>
+                </a:solidFill>
+              </a:rPr>
+              <a:t>Manufacture of solid fuels and other energy industries.</a:t>
+            </a:r>
+          </a:p>
+        </p:txBody>
+      </p:sp>
+      <p:pic>
+        <p:nvPicPr>
+          <p:cNvPr id="22" name="Picture 21" descr="Icon&#10;&#10;Description automatically generated">
+            <a:extLst>
+              <a:ext uri="{FF2B5EF4-FFF2-40B4-BE49-F238E27FC236}">
+                <a16:creationId xmlns:a16="http://schemas.microsoft.com/office/drawing/2014/main" id="{D256E5C7-F4BC-A9E6-BBC5-C95CFB8348F4}"/>
+              </a:ext>
+            </a:extLst>
+          </p:cNvPr>
+          <p:cNvPicPr>
+            <a:picLocks noChangeAspect="1"/>
+          </p:cNvPicPr>
+          <p:nvPr/>
+        </p:nvPicPr>
+        <p:blipFill>
+          <a:blip r:embed="rId2">
+            <a:extLst>
+              <a:ext uri="{28A0092B-C50C-407E-A947-70E740481C1C}">
+                <a14:useLocalDpi xmlns:a14="http://schemas.microsoft.com/office/drawing/2010/main" val="0"/>
+              </a:ext>
+            </a:extLst>
+          </a:blip>
+          <a:stretch>
+            <a:fillRect/>
+          </a:stretch>
+        </p:blipFill>
+        <p:spPr>
+          <a:xfrm>
+            <a:off x="1947488" y="4231086"/>
+            <a:ext cx="1877265" cy="1702266"/>
+          </a:xfrm>
+          <a:prstGeom prst="rect">
+            <a:avLst/>
+          </a:prstGeom>
+        </p:spPr>
+      </p:pic>
+    </p:spTree>
+    <p:extLst>
+      <p:ext uri="{BB962C8B-B14F-4D97-AF65-F5344CB8AC3E}">
+        <p14:creationId xmlns:p14="http://schemas.microsoft.com/office/powerpoint/2010/main" val="643842168"/>
+      </p:ext>
+    </p:extLst>
+  </p:cSld>
+  <p:clrMapOvr>
+    <a:masterClrMapping/>
+  </p:clrMapOvr>
+</p:sld>
+</file>
+
+<file path=ppt/slides/slide17.xml><?xml version="1.0" encoding="utf-8"?>
+<p:sld xmlns:a="http://schemas.openxmlformats.org/drawingml/2006/main" xmlns:r="http://schemas.openxmlformats.org/officeDocument/2006/relationships" xmlns:p="http://schemas.openxmlformats.org/presentationml/2006/main">
+  <p:cSld>
+    <p:spTree>
+      <p:nvGrpSpPr>
+        <p:cNvPr id="1" name=""/>
+        <p:cNvGrpSpPr/>
+        <p:nvPr/>
+      </p:nvGrpSpPr>
+      <p:grpSpPr>
+        <a:xfrm>
+          <a:off x="0" y="0"/>
+          <a:ext cx="0" cy="0"/>
+          <a:chOff x="0" y="0"/>
+          <a:chExt cx="0" cy="0"/>
+        </a:xfrm>
+      </p:grpSpPr>
+      <p:sp>
+        <p:nvSpPr>
           <p:cNvPr id="2" name="Title 1">
             <a:extLst>
               <a:ext uri="{FF2B5EF4-FFF2-40B4-BE49-F238E27FC236}">
@@ -15056,43 +16899,6 @@
           </a:p>
         </p:txBody>
       </p:sp>
-      <p:sp>
-        <p:nvSpPr>
-          <p:cNvPr id="11" name="Subtitle 10">
-            <a:extLst>
-              <a:ext uri="{FF2B5EF4-FFF2-40B4-BE49-F238E27FC236}">
-                <a16:creationId xmlns:a16="http://schemas.microsoft.com/office/drawing/2014/main" id="{F0F25866-5DB1-334A-8037-692579FBDE39}"/>
-              </a:ext>
-            </a:extLst>
-          </p:cNvPr>
-          <p:cNvSpPr>
-            <a:spLocks noGrp="1"/>
-          </p:cNvSpPr>
-          <p:nvPr>
-            <p:ph type="subTitle" idx="1"/>
-          </p:nvPr>
-        </p:nvSpPr>
-        <p:spPr/>
-        <p:txBody>
-          <a:bodyPr/>
-          <a:lstStyle/>
-          <a:p>
-            <a:r>
-              <a:rPr lang="en-US" dirty="0"/>
-              <a:t>Thanks to your commitment and strong work ethic, we know next year will be even better than the last. </a:t>
-            </a:r>
-          </a:p>
-          <a:p>
-            <a:r>
-              <a:rPr lang="en-US" dirty="0"/>
-              <a:t>We look forward to working together. </a:t>
-            </a:r>
-          </a:p>
-          <a:p>
-            <a:endParaRPr lang="en-US" dirty="0"/>
-          </a:p>
-        </p:txBody>
-      </p:sp>
       <p:pic>
         <p:nvPicPr>
           <p:cNvPr id="13" name="Picture Placeholder 12" descr="Portrait of a team member">
@@ -15143,16 +16949,21 @@
             <p:ph type="body" sz="quarter" idx="11"/>
           </p:nvPr>
         </p:nvSpPr>
-        <p:spPr/>
+        <p:spPr>
+          <a:xfrm>
+            <a:off x="6907623" y="3688899"/>
+            <a:ext cx="1143495" cy="588795"/>
+          </a:xfrm>
+        </p:spPr>
         <p:txBody>
           <a:bodyPr/>
           <a:lstStyle/>
           <a:p>
             <a:r>
-              <a:rPr lang="en-US" b="1" dirty="0"/>
+              <a:rPr lang="en-US" sz="2000" b="1" dirty="0"/>
               <a:t>Group 4</a:t>
             </a:r>
-            <a:endParaRPr lang="en-US" dirty="0"/>
+            <a:endParaRPr lang="en-US" sz="2000" dirty="0"/>
           </a:p>
         </p:txBody>
       </p:sp>
@@ -15246,7 +17057,11 @@
           <a:lstStyle/>
           <a:p>
             <a:r>
-              <a:rPr lang="en-US" dirty="0"/>
+              <a:rPr lang="en-US" dirty="0">
+                <a:solidFill>
+                  <a:schemeClr val="bg1"/>
+                </a:solidFill>
+              </a:rPr>
               <a:t>01. Introduction</a:t>
             </a:r>
           </a:p>
@@ -15270,7 +17085,7 @@
         </p:nvSpPr>
         <p:spPr>
           <a:xfrm>
-            <a:off x="952500" y="2818296"/>
+            <a:off x="952500" y="2650204"/>
             <a:ext cx="2133600" cy="778796"/>
           </a:xfrm>
         </p:spPr>
@@ -15312,7 +17127,11 @@
           <a:lstStyle/>
           <a:p>
             <a:r>
-              <a:rPr lang="en-US" dirty="0"/>
+              <a:rPr lang="en-US" dirty="0">
+                <a:solidFill>
+                  <a:schemeClr val="bg1"/>
+                </a:solidFill>
+              </a:rPr>
               <a:t>2. Who?</a:t>
             </a:r>
           </a:p>
@@ -15336,17 +17155,31 @@
         </p:nvSpPr>
         <p:spPr>
           <a:xfrm>
-            <a:off x="3663042" y="2818295"/>
-            <a:ext cx="2128157" cy="943807"/>
+            <a:off x="3663042" y="2679128"/>
+            <a:ext cx="3139540" cy="755695"/>
           </a:xfrm>
         </p:spPr>
         <p:txBody>
           <a:bodyPr/>
           <a:lstStyle/>
           <a:p>
+            <a:pPr marL="285750" indent="-285750">
+              <a:buFont typeface="Arial" panose="020B0604020202020204" pitchFamily="34" charset="0"/>
+              <a:buChar char="•"/>
+            </a:pPr>
             <a:r>
               <a:rPr lang="en-US" dirty="0"/>
-              <a:t>Which Sector produces the most emissions? And which End User is responsible for most emissions?</a:t>
+              <a:t>Which Sector produces the most emissions? </a:t>
+            </a:r>
+          </a:p>
+          <a:p>
+            <a:pPr marL="285750" indent="-285750">
+              <a:buFont typeface="Arial" panose="020B0604020202020204" pitchFamily="34" charset="0"/>
+              <a:buChar char="•"/>
+            </a:pPr>
+            <a:r>
+              <a:rPr lang="en-US" dirty="0"/>
+              <a:t>Which End User is responsible for most emissions?</a:t>
             </a:r>
           </a:p>
         </p:txBody>
@@ -15378,7 +17211,11 @@
           <a:lstStyle/>
           <a:p>
             <a:r>
-              <a:rPr lang="en-US" dirty="0"/>
+              <a:rPr lang="en-US" dirty="0">
+                <a:solidFill>
+                  <a:schemeClr val="bg1"/>
+                </a:solidFill>
+              </a:rPr>
               <a:t>03. What?</a:t>
             </a:r>
           </a:p>
@@ -15412,7 +17249,7 @@
           <a:p>
             <a:r>
               <a:rPr lang="en-US" dirty="0"/>
-              <a:t>Which Fuel is being used to emit the most emissions?</a:t>
+              <a:t>Which fuel used contributes to the most emissions?</a:t>
             </a:r>
           </a:p>
         </p:txBody>
@@ -15444,8 +17281,12 @@
           <a:lstStyle/>
           <a:p>
             <a:r>
-              <a:rPr lang="en-US" dirty="0"/>
-              <a:t>04. When?</a:t>
+              <a:rPr lang="en-US" dirty="0">
+                <a:solidFill>
+                  <a:schemeClr val="bg1"/>
+                </a:solidFill>
+              </a:rPr>
+              <a:t>04. How?</a:t>
             </a:r>
           </a:p>
         </p:txBody>
@@ -15469,7 +17310,7 @@
         <p:spPr>
           <a:xfrm>
             <a:off x="3663042" y="5131299"/>
-            <a:ext cx="2128157" cy="847638"/>
+            <a:ext cx="2345872" cy="847638"/>
           </a:xfrm>
         </p:spPr>
         <p:txBody>
@@ -15478,8 +17319,11 @@
           <a:p>
             <a:r>
               <a:rPr lang="en-US" dirty="0"/>
-              <a:t>How much has what we’re producing changed over time?</a:t>
-            </a:r>
+              <a:t>How much of our activities has changed over the course of time ?</a:t>
+            </a:r>
+          </a:p>
+          <a:p>
+            <a:endParaRPr lang="en-US" dirty="0"/>
           </a:p>
         </p:txBody>
       </p:sp>
@@ -15510,7 +17354,11 @@
           <a:lstStyle/>
           <a:p>
             <a:r>
-              <a:rPr lang="en-US" dirty="0"/>
+              <a:rPr lang="en-US" dirty="0">
+                <a:solidFill>
+                  <a:schemeClr val="bg1"/>
+                </a:solidFill>
+              </a:rPr>
               <a:t>05. Closing</a:t>
             </a:r>
           </a:p>
@@ -15581,39 +17429,6 @@
               <a:t>2</a:t>
             </a:fld>
             <a:endParaRPr lang="en-US" dirty="0"/>
-          </a:p>
-        </p:txBody>
-      </p:sp>
-      <p:sp>
-        <p:nvSpPr>
-          <p:cNvPr id="14" name="Footer Placeholder 13">
-            <a:extLst>
-              <a:ext uri="{FF2B5EF4-FFF2-40B4-BE49-F238E27FC236}">
-                <a16:creationId xmlns:a16="http://schemas.microsoft.com/office/drawing/2014/main" id="{C0BAE34D-BF83-084B-A10C-EB85694B9ACF}"/>
-              </a:ext>
-            </a:extLst>
-          </p:cNvPr>
-          <p:cNvSpPr>
-            <a:spLocks noGrp="1"/>
-          </p:cNvSpPr>
-          <p:nvPr>
-            <p:ph type="ftr" sz="quarter" idx="26"/>
-          </p:nvPr>
-        </p:nvSpPr>
-        <p:spPr>
-          <a:xfrm>
-            <a:off x="1494790" y="6332220"/>
-            <a:ext cx="1497330" cy="247651"/>
-          </a:xfrm>
-        </p:spPr>
-        <p:txBody>
-          <a:bodyPr/>
-          <a:lstStyle/>
-          <a:p>
-            <a:r>
-              <a:rPr lang="en-US" dirty="0"/>
-              <a:t>Project One</a:t>
-            </a:r>
           </a:p>
         </p:txBody>
       </p:sp>
@@ -15691,22 +17506,30 @@
             <p:ph type="body" sz="quarter" idx="11"/>
           </p:nvPr>
         </p:nvSpPr>
-        <p:spPr/>
+        <p:spPr>
+          <a:xfrm>
+            <a:off x="83127" y="2303813"/>
+            <a:ext cx="6012873" cy="2780782"/>
+          </a:xfrm>
+        </p:spPr>
         <p:txBody>
           <a:bodyPr/>
           <a:lstStyle/>
           <a:p>
-            <a:r>
-              <a:rPr lang="en-US" dirty="0"/>
-              <a:t>Blah blah </a:t>
-            </a:r>
-            <a:r>
-              <a:rPr lang="en-US" dirty="0" err="1"/>
-              <a:t>blahh</a:t>
-            </a:r>
-            <a:endParaRPr lang="en-US" dirty="0"/>
-          </a:p>
-          <a:p>
+            <a:pPr marL="285750" indent="-285750">
+              <a:buFont typeface="Arial" panose="020B0604020202020204" pitchFamily="34" charset="0"/>
+              <a:buChar char="•"/>
+            </a:pPr>
+            <a:r>
+              <a:rPr lang="en-GB" b="0" i="0" u="none" strike="noStrike" dirty="0">
+                <a:solidFill>
+                  <a:srgbClr val="1B1B1B"/>
+                </a:solidFill>
+                <a:effectLst/>
+                <a:latin typeface="Source Sans Pro Web"/>
+              </a:rPr>
+              <a:t>Greenhouse gases (GHGs) warm the Earth by absorbing energy and slowing the rate at which the energy dissipates to space; thus insulating the Earth</a:t>
+            </a:r>
             <a:endParaRPr lang="en-US" dirty="0"/>
           </a:p>
         </p:txBody>
@@ -15743,39 +17566,6 @@
               <a:t>3</a:t>
             </a:fld>
             <a:endParaRPr lang="en-US" dirty="0"/>
-          </a:p>
-        </p:txBody>
-      </p:sp>
-      <p:sp>
-        <p:nvSpPr>
-          <p:cNvPr id="6" name="Footer Placeholder 5">
-            <a:extLst>
-              <a:ext uri="{FF2B5EF4-FFF2-40B4-BE49-F238E27FC236}">
-                <a16:creationId xmlns:a16="http://schemas.microsoft.com/office/drawing/2014/main" id="{66F3960A-D260-8445-A153-0B674474CEBD}"/>
-              </a:ext>
-            </a:extLst>
-          </p:cNvPr>
-          <p:cNvSpPr>
-            <a:spLocks noGrp="1"/>
-          </p:cNvSpPr>
-          <p:nvPr>
-            <p:ph type="ftr" sz="quarter" idx="15"/>
-          </p:nvPr>
-        </p:nvSpPr>
-        <p:spPr>
-          <a:xfrm>
-            <a:off x="1494790" y="6332220"/>
-            <a:ext cx="1497330" cy="247651"/>
-          </a:xfrm>
-        </p:spPr>
-        <p:txBody>
-          <a:bodyPr/>
-          <a:lstStyle/>
-          <a:p>
-            <a:r>
-              <a:rPr lang="en-US" dirty="0"/>
-              <a:t>Project One</a:t>
-            </a:r>
           </a:p>
         </p:txBody>
       </p:sp>
@@ -16950,8 +18740,8 @@
         </p:blipFill>
         <p:spPr>
           <a:xfrm>
-            <a:off x="98131" y="2410692"/>
-            <a:ext cx="6384228" cy="4131394"/>
+            <a:off x="130718" y="2410692"/>
+            <a:ext cx="6496633" cy="4204134"/>
           </a:xfrm>
           <a:prstGeom prst="rect">
             <a:avLst/>
@@ -17800,6 +19590,214 @@
           </a:prstGeom>
         </p:spPr>
       </p:pic>
+      <p:sp>
+        <p:nvSpPr>
+          <p:cNvPr id="3" name="TextBox 2">
+            <a:extLst>
+              <a:ext uri="{FF2B5EF4-FFF2-40B4-BE49-F238E27FC236}">
+                <a16:creationId xmlns:a16="http://schemas.microsoft.com/office/drawing/2014/main" id="{6C50107B-927B-0E4A-BE4C-AC17B0D5B4A8}"/>
+              </a:ext>
+            </a:extLst>
+          </p:cNvPr>
+          <p:cNvSpPr txBox="1"/>
+          <p:nvPr/>
+        </p:nvSpPr>
+        <p:spPr>
+          <a:xfrm>
+            <a:off x="9524118" y="5465101"/>
+            <a:ext cx="1835759" cy="369332"/>
+          </a:xfrm>
+          <a:prstGeom prst="rect">
+            <a:avLst/>
+          </a:prstGeom>
+          <a:noFill/>
+        </p:spPr>
+        <p:txBody>
+          <a:bodyPr wrap="none" rtlCol="0">
+            <a:spAutoFit/>
+          </a:bodyPr>
+          <a:lstStyle/>
+          <a:p>
+            <a:r>
+              <a:rPr lang="en-US" dirty="0">
+                <a:solidFill>
+                  <a:schemeClr val="bg1"/>
+                </a:solidFill>
+              </a:rPr>
+              <a:t>Biomass Burning</a:t>
+            </a:r>
+          </a:p>
+        </p:txBody>
+      </p:sp>
+      <p:sp>
+        <p:nvSpPr>
+          <p:cNvPr id="6" name="TextBox 5">
+            <a:extLst>
+              <a:ext uri="{FF2B5EF4-FFF2-40B4-BE49-F238E27FC236}">
+                <a16:creationId xmlns:a16="http://schemas.microsoft.com/office/drawing/2014/main" id="{D2785AB1-CBB5-A6BC-F0FB-F6D7888F1892}"/>
+              </a:ext>
+            </a:extLst>
+          </p:cNvPr>
+          <p:cNvSpPr txBox="1"/>
+          <p:nvPr/>
+        </p:nvSpPr>
+        <p:spPr>
+          <a:xfrm>
+            <a:off x="9231458" y="2460819"/>
+            <a:ext cx="2738869" cy="1384995"/>
+          </a:xfrm>
+          <a:prstGeom prst="rect">
+            <a:avLst/>
+          </a:prstGeom>
+          <a:noFill/>
+        </p:spPr>
+        <p:txBody>
+          <a:bodyPr wrap="square">
+            <a:spAutoFit/>
+          </a:bodyPr>
+          <a:lstStyle/>
+          <a:p>
+            <a:r>
+              <a:rPr lang="en-GB" sz="1200" i="0" u="none" strike="noStrike" dirty="0">
+                <a:solidFill>
+                  <a:srgbClr val="202124"/>
+                </a:solidFill>
+                <a:effectLst/>
+                <a:latin typeface="arial" panose="020B0604020202020204" pitchFamily="34" charset="0"/>
+              </a:rPr>
+              <a:t>Drainage of organic soils releases CO</a:t>
+            </a:r>
+            <a:r>
+              <a:rPr lang="en-GB" sz="1200" i="0" u="none" strike="noStrike" baseline="-25000" dirty="0">
+                <a:solidFill>
+                  <a:srgbClr val="202124"/>
+                </a:solidFill>
+                <a:effectLst/>
+                <a:latin typeface="arial" panose="020B0604020202020204" pitchFamily="34" charset="0"/>
+              </a:rPr>
+              <a:t>2</a:t>
+            </a:r>
+            <a:r>
+              <a:rPr lang="en-GB" sz="1200" i="0" u="none" strike="noStrike" dirty="0">
+                <a:solidFill>
+                  <a:srgbClr val="202124"/>
+                </a:solidFill>
+                <a:effectLst/>
+                <a:latin typeface="arial" panose="020B0604020202020204" pitchFamily="34" charset="0"/>
+              </a:rPr>
+              <a:t> and NO</a:t>
+            </a:r>
+            <a:r>
+              <a:rPr lang="en-GB" sz="1200" i="0" u="none" strike="noStrike" baseline="-25000" dirty="0">
+                <a:solidFill>
+                  <a:srgbClr val="202124"/>
+                </a:solidFill>
+                <a:effectLst/>
+                <a:latin typeface="arial" panose="020B0604020202020204" pitchFamily="34" charset="0"/>
+              </a:rPr>
+              <a:t>2</a:t>
+            </a:r>
+            <a:r>
+              <a:rPr lang="en-GB" sz="1200" i="0" u="none" strike="noStrike" dirty="0">
+                <a:solidFill>
+                  <a:srgbClr val="202124"/>
+                </a:solidFill>
+                <a:effectLst/>
+                <a:latin typeface="arial" panose="020B0604020202020204" pitchFamily="34" charset="0"/>
+              </a:rPr>
+              <a:t> into the atmosphere</a:t>
+            </a:r>
+          </a:p>
+          <a:p>
+            <a:endParaRPr lang="en-GB" sz="1200" dirty="0">
+              <a:solidFill>
+                <a:srgbClr val="202124"/>
+              </a:solidFill>
+              <a:latin typeface="arial" panose="020B0604020202020204" pitchFamily="34" charset="0"/>
+            </a:endParaRPr>
+          </a:p>
+          <a:p>
+            <a:r>
+              <a:rPr lang="en-GB" sz="1200" i="0" u="none" strike="noStrike" dirty="0">
+                <a:solidFill>
+                  <a:srgbClr val="202124"/>
+                </a:solidFill>
+                <a:effectLst/>
+                <a:latin typeface="arial" panose="020B0604020202020204" pitchFamily="34" charset="0"/>
+              </a:rPr>
+              <a:t>Farming (Cropland)</a:t>
+            </a:r>
+          </a:p>
+          <a:p>
+            <a:endParaRPr lang="en-GB" sz="1200" b="0" i="0" u="none" strike="noStrike" dirty="0">
+              <a:solidFill>
+                <a:srgbClr val="4D4C44"/>
+              </a:solidFill>
+              <a:effectLst/>
+              <a:latin typeface="Hind" panose="020B0604020202020204" pitchFamily="34" charset="0"/>
+            </a:endParaRPr>
+          </a:p>
+          <a:p>
+            <a:r>
+              <a:rPr lang="en-GB" sz="1200" dirty="0">
+                <a:solidFill>
+                  <a:srgbClr val="4D4C44"/>
+                </a:solidFill>
+                <a:latin typeface="Hind" panose="020B0604020202020204" pitchFamily="34" charset="0"/>
+              </a:rPr>
+              <a:t>W</a:t>
+            </a:r>
+            <a:r>
+              <a:rPr lang="en-GB" sz="1200" b="0" i="0" u="none" strike="noStrike" dirty="0">
+                <a:solidFill>
+                  <a:srgbClr val="4D4C44"/>
+                </a:solidFill>
+                <a:effectLst/>
+                <a:latin typeface="Hind" panose="020B0604020202020204" pitchFamily="34" charset="0"/>
+              </a:rPr>
+              <a:t>etland - </a:t>
+            </a:r>
+            <a:r>
+              <a:rPr lang="en-GB" sz="1200" dirty="0">
+                <a:solidFill>
+                  <a:srgbClr val="4D4C44"/>
+                </a:solidFill>
+                <a:latin typeface="Hind" panose="020B0604020202020204" pitchFamily="34" charset="0"/>
+              </a:rPr>
+              <a:t>P</a:t>
+            </a:r>
+            <a:r>
+              <a:rPr lang="en-GB" sz="1200" b="0" i="0" u="none" strike="noStrike" dirty="0">
+                <a:solidFill>
+                  <a:srgbClr val="4D4C44"/>
+                </a:solidFill>
+                <a:effectLst/>
+                <a:latin typeface="Hind" panose="020B0604020202020204" pitchFamily="34" charset="0"/>
+              </a:rPr>
+              <a:t>lants growing </a:t>
+            </a:r>
+            <a:r>
+              <a:rPr lang="en-GB" sz="1200" dirty="0">
+                <a:solidFill>
+                  <a:srgbClr val="4D4C44"/>
+                </a:solidFill>
+                <a:latin typeface="Hind" panose="020B0604020202020204" pitchFamily="34" charset="0"/>
+              </a:rPr>
+              <a:t>in wetlands </a:t>
+            </a:r>
+            <a:r>
+              <a:rPr lang="en-GB" sz="1200" b="0" i="0" u="none" strike="noStrike" dirty="0">
+                <a:solidFill>
+                  <a:srgbClr val="4D4C44"/>
+                </a:solidFill>
+                <a:effectLst/>
+                <a:latin typeface="Hind" panose="020B0604020202020204" pitchFamily="34" charset="0"/>
+              </a:rPr>
+              <a:t>emit methane to the atmosphere. </a:t>
+            </a:r>
+          </a:p>
+        </p:txBody>
+      </p:sp>
     </p:spTree>
     <p:extLst>
       <p:ext uri="{BB962C8B-B14F-4D97-AF65-F5344CB8AC3E}">
@@ -18871,15 +20869,6 @@
 </file>
 
 <file path=customXml/item2.xml><?xml version="1.0" encoding="utf-8"?>
-<?mso-contentType ?>
-<FormTemplates xmlns="http://schemas.microsoft.com/sharepoint/v3/contenttype/forms">
-  <Display>DocumentLibraryForm</Display>
-  <Edit>DocumentLibraryForm</Edit>
-  <New>DocumentLibraryForm</New>
-</FormTemplates>
-</file>
-
-<file path=customXml/item3.xml><?xml version="1.0" encoding="utf-8"?>
 <ct:contentTypeSchema xmlns:ct="http://schemas.microsoft.com/office/2006/metadata/contentType" xmlns:ma="http://schemas.microsoft.com/office/2006/metadata/properties/metaAttributes" ct:_="" ma:_="" ma:contentTypeName="Document" ma:contentTypeID="0x01010079F111ED35F8CC479449609E8A0923A6" ma:contentTypeVersion="12" ma:contentTypeDescription="Create a new document." ma:contentTypeScope="" ma:versionID="426e97fa315356fffbdcd9876fe988c2">
   <xsd:schema xmlns:xsd="http://www.w3.org/2001/XMLSchema" xmlns:xs="http://www.w3.org/2001/XMLSchema" xmlns:p="http://schemas.microsoft.com/office/2006/metadata/properties" xmlns:ns2="71af3243-3dd4-4a8d-8c0d-dd76da1f02a5" xmlns:ns3="16c05727-aa75-4e4a-9b5f-8a80a1165891" targetNamespace="http://schemas.microsoft.com/office/2006/metadata/properties" ma:root="true" ma:fieldsID="14b8f0def80e6d70ce3def20c90759ae" ns2:_="" ns3:_="">
     <xsd:import namespace="71af3243-3dd4-4a8d-8c0d-dd76da1f02a5"/>
@@ -19100,6 +21089,15 @@
 </ct:contentTypeSchema>
 </file>
 
+<file path=customXml/item3.xml><?xml version="1.0" encoding="utf-8"?>
+<?mso-contentType ?>
+<FormTemplates xmlns="http://schemas.microsoft.com/sharepoint/v3/contenttype/forms">
+  <Display>DocumentLibraryForm</Display>
+  <Edit>DocumentLibraryForm</Edit>
+  <New>DocumentLibraryForm</New>
+</FormTemplates>
+</file>
+
 <file path=customXml/itemProps1.xml><?xml version="1.0" encoding="utf-8"?>
 <ds:datastoreItem xmlns:ds="http://schemas.openxmlformats.org/officeDocument/2006/customXml" ds:itemID="{09EC1AB0-9704-404D-B6D3-819D938AC55B}">
   <ds:schemaRefs>
@@ -19111,14 +21109,6 @@
 </file>
 
 <file path=customXml/itemProps2.xml><?xml version="1.0" encoding="utf-8"?>
-<ds:datastoreItem xmlns:ds="http://schemas.openxmlformats.org/officeDocument/2006/customXml" ds:itemID="{1D20B6E4-879E-4E6C-BDE7-261540CD3765}">
-  <ds:schemaRefs>
-    <ds:schemaRef ds:uri="http://schemas.microsoft.com/sharepoint/v3/contenttype/forms"/>
-  </ds:schemaRefs>
-</ds:datastoreItem>
-</file>
-
-<file path=customXml/itemProps3.xml><?xml version="1.0" encoding="utf-8"?>
 <ds:datastoreItem xmlns:ds="http://schemas.openxmlformats.org/officeDocument/2006/customXml" ds:itemID="{94F21D10-BD83-491A-AAA6-945C2DB1EB01}">
   <ds:schemaRefs>
     <ds:schemaRef ds:uri="http://schemas.microsoft.com/office/2006/metadata/contentType"/>
@@ -19135,4 +21125,12 @@
     <ds:schemaRef ds:uri="http://schemas.microsoft.com/internal/obd"/>
   </ds:schemaRefs>
 </ds:datastoreItem>
+</file>
+
+<file path=customXml/itemProps3.xml><?xml version="1.0" encoding="utf-8"?>
+<ds:datastoreItem xmlns:ds="http://schemas.openxmlformats.org/officeDocument/2006/customXml" ds:itemID="{1D20B6E4-879E-4E6C-BDE7-261540CD3765}">
+  <ds:schemaRefs>
+    <ds:schemaRef ds:uri="http://schemas.microsoft.com/sharepoint/v3/contenttype/forms"/>
+  </ds:schemaRefs>
+</ds:datastoreItem>
 </file>
</xml_diff>